<commit_message>
made further improvements to code/figures
</commit_message>
<xml_diff>
--- a/Figures/TPUvNoTPU.pptx
+++ b/Figures/TPUvNoTPU.pptx
@@ -2,7 +2,7 @@
 <file path=ppt/presentation.xml><?xml version="1.0" encoding="utf-8"?>
 <p:presentation xmlns:a="http://schemas.openxmlformats.org/drawingml/2006/main" xmlns:r="http://schemas.openxmlformats.org/officeDocument/2006/relationships" xmlns:p="http://schemas.openxmlformats.org/presentationml/2006/main" saveSubsetFonts="1">
   <p:sldMasterIdLst>
-    <p:sldMasterId id="2147483648" r:id="rId1"/>
+    <p:sldMasterId id="2147483660" r:id="rId1"/>
   </p:sldMasterIdLst>
   <p:sldIdLst>
     <p:sldId id="256" r:id="rId2"/>
@@ -11,13 +11,13 @@
     <p:sldId id="259" r:id="rId5"/>
     <p:sldId id="260" r:id="rId6"/>
   </p:sldIdLst>
-  <p:sldSz cx="12192000" cy="6858000"/>
+  <p:sldSz cx="13716000" cy="13716000"/>
   <p:notesSz cx="6858000" cy="9144000"/>
   <p:defaultTextStyle>
     <a:defPPr>
       <a:defRPr lang="en-US"/>
     </a:defPPr>
-    <a:lvl1pPr marL="0" algn="l" defTabSz="914400" rtl="0" eaLnBrk="1" latinLnBrk="0" hangingPunct="1">
+    <a:lvl1pPr marL="0" algn="l" defTabSz="457200" rtl="0" eaLnBrk="1" latinLnBrk="0" hangingPunct="1">
       <a:defRPr sz="1800" kern="1200">
         <a:solidFill>
           <a:schemeClr val="tx1"/>
@@ -27,7 +27,7 @@
         <a:cs typeface="+mn-cs"/>
       </a:defRPr>
     </a:lvl1pPr>
-    <a:lvl2pPr marL="457200" algn="l" defTabSz="914400" rtl="0" eaLnBrk="1" latinLnBrk="0" hangingPunct="1">
+    <a:lvl2pPr marL="457200" algn="l" defTabSz="457200" rtl="0" eaLnBrk="1" latinLnBrk="0" hangingPunct="1">
       <a:defRPr sz="1800" kern="1200">
         <a:solidFill>
           <a:schemeClr val="tx1"/>
@@ -37,7 +37,7 @@
         <a:cs typeface="+mn-cs"/>
       </a:defRPr>
     </a:lvl2pPr>
-    <a:lvl3pPr marL="914400" algn="l" defTabSz="914400" rtl="0" eaLnBrk="1" latinLnBrk="0" hangingPunct="1">
+    <a:lvl3pPr marL="914400" algn="l" defTabSz="457200" rtl="0" eaLnBrk="1" latinLnBrk="0" hangingPunct="1">
       <a:defRPr sz="1800" kern="1200">
         <a:solidFill>
           <a:schemeClr val="tx1"/>
@@ -47,7 +47,7 @@
         <a:cs typeface="+mn-cs"/>
       </a:defRPr>
     </a:lvl3pPr>
-    <a:lvl4pPr marL="1371600" algn="l" defTabSz="914400" rtl="0" eaLnBrk="1" latinLnBrk="0" hangingPunct="1">
+    <a:lvl4pPr marL="1371600" algn="l" defTabSz="457200" rtl="0" eaLnBrk="1" latinLnBrk="0" hangingPunct="1">
       <a:defRPr sz="1800" kern="1200">
         <a:solidFill>
           <a:schemeClr val="tx1"/>
@@ -57,7 +57,7 @@
         <a:cs typeface="+mn-cs"/>
       </a:defRPr>
     </a:lvl4pPr>
-    <a:lvl5pPr marL="1828800" algn="l" defTabSz="914400" rtl="0" eaLnBrk="1" latinLnBrk="0" hangingPunct="1">
+    <a:lvl5pPr marL="1828800" algn="l" defTabSz="457200" rtl="0" eaLnBrk="1" latinLnBrk="0" hangingPunct="1">
       <a:defRPr sz="1800" kern="1200">
         <a:solidFill>
           <a:schemeClr val="tx1"/>
@@ -67,7 +67,7 @@
         <a:cs typeface="+mn-cs"/>
       </a:defRPr>
     </a:lvl5pPr>
-    <a:lvl6pPr marL="2286000" algn="l" defTabSz="914400" rtl="0" eaLnBrk="1" latinLnBrk="0" hangingPunct="1">
+    <a:lvl6pPr marL="2286000" algn="l" defTabSz="457200" rtl="0" eaLnBrk="1" latinLnBrk="0" hangingPunct="1">
       <a:defRPr sz="1800" kern="1200">
         <a:solidFill>
           <a:schemeClr val="tx1"/>
@@ -77,7 +77,7 @@
         <a:cs typeface="+mn-cs"/>
       </a:defRPr>
     </a:lvl6pPr>
-    <a:lvl7pPr marL="2743200" algn="l" defTabSz="914400" rtl="0" eaLnBrk="1" latinLnBrk="0" hangingPunct="1">
+    <a:lvl7pPr marL="2743200" algn="l" defTabSz="457200" rtl="0" eaLnBrk="1" latinLnBrk="0" hangingPunct="1">
       <a:defRPr sz="1800" kern="1200">
         <a:solidFill>
           <a:schemeClr val="tx1"/>
@@ -87,7 +87,7 @@
         <a:cs typeface="+mn-cs"/>
       </a:defRPr>
     </a:lvl7pPr>
-    <a:lvl8pPr marL="3200400" algn="l" defTabSz="914400" rtl="0" eaLnBrk="1" latinLnBrk="0" hangingPunct="1">
+    <a:lvl8pPr marL="3200400" algn="l" defTabSz="457200" rtl="0" eaLnBrk="1" latinLnBrk="0" hangingPunct="1">
       <a:defRPr sz="1800" kern="1200">
         <a:solidFill>
           <a:schemeClr val="tx1"/>
@@ -97,7 +97,7 @@
         <a:cs typeface="+mn-cs"/>
       </a:defRPr>
     </a:lvl8pPr>
-    <a:lvl9pPr marL="3657600" algn="l" defTabSz="914400" rtl="0" eaLnBrk="1" latinLnBrk="0" hangingPunct="1">
+    <a:lvl9pPr marL="3657600" algn="l" defTabSz="457200" rtl="0" eaLnBrk="1" latinLnBrk="0" hangingPunct="1">
       <a:defRPr sz="1800" kern="1200">
         <a:solidFill>
           <a:schemeClr val="tx1"/>
@@ -135,13 +135,7 @@
       </p:grpSpPr>
       <p:sp>
         <p:nvSpPr>
-          <p:cNvPr id="2" name="Title 1">
-            <a:extLst>
-              <a:ext uri="{FF2B5EF4-FFF2-40B4-BE49-F238E27FC236}">
-                <a16:creationId xmlns:a16="http://schemas.microsoft.com/office/drawing/2014/main" id="{E5DCCAEB-A2A9-7A1F-2917-15CC51B40553}"/>
-              </a:ext>
-            </a:extLst>
-          </p:cNvPr>
+          <p:cNvPr id="2" name="Title 1"/>
           <p:cNvSpPr>
             <a:spLocks noGrp="1"/>
           </p:cNvSpPr>
@@ -151,15 +145,15 @@
         </p:nvSpPr>
         <p:spPr>
           <a:xfrm>
-            <a:off x="1524000" y="1122363"/>
-            <a:ext cx="9144000" cy="2387600"/>
+            <a:off x="1028700" y="2244726"/>
+            <a:ext cx="11658600" cy="4775200"/>
           </a:xfrm>
         </p:spPr>
         <p:txBody>
           <a:bodyPr anchor="b"/>
           <a:lstStyle>
             <a:lvl1pPr algn="ctr">
-              <a:defRPr sz="6000"/>
+              <a:defRPr sz="9000"/>
             </a:lvl1pPr>
           </a:lstStyle>
           <a:p>
@@ -167,18 +161,13 @@
               <a:rPr lang="en-US"/>
               <a:t>Click to edit Master title style</a:t>
             </a:r>
-          </a:p>
-        </p:txBody>
-      </p:sp>
-      <p:sp>
-        <p:nvSpPr>
-          <p:cNvPr id="3" name="Subtitle 2">
-            <a:extLst>
-              <a:ext uri="{FF2B5EF4-FFF2-40B4-BE49-F238E27FC236}">
-                <a16:creationId xmlns:a16="http://schemas.microsoft.com/office/drawing/2014/main" id="{A856015E-4A78-2826-A1B6-416808EB4889}"/>
-              </a:ext>
-            </a:extLst>
-          </p:cNvPr>
+            <a:endParaRPr lang="en-US" dirty="0"/>
+          </a:p>
+        </p:txBody>
+      </p:sp>
+      <p:sp>
+        <p:nvSpPr>
+          <p:cNvPr id="3" name="Subtitle 2"/>
           <p:cNvSpPr>
             <a:spLocks noGrp="1"/>
           </p:cNvSpPr>
@@ -188,8 +177,8 @@
         </p:nvSpPr>
         <p:spPr>
           <a:xfrm>
-            <a:off x="1524000" y="3602038"/>
-            <a:ext cx="9144000" cy="1655762"/>
+            <a:off x="1714500" y="7204076"/>
+            <a:ext cx="10287000" cy="3311524"/>
           </a:xfrm>
         </p:spPr>
         <p:txBody>
@@ -197,39 +186,39 @@
           <a:lstStyle>
             <a:lvl1pPr marL="0" indent="0" algn="ctr">
               <a:buNone/>
+              <a:defRPr sz="3600"/>
+            </a:lvl1pPr>
+            <a:lvl2pPr marL="685800" indent="0" algn="ctr">
+              <a:buNone/>
+              <a:defRPr sz="3000"/>
+            </a:lvl2pPr>
+            <a:lvl3pPr marL="1371600" indent="0" algn="ctr">
+              <a:buNone/>
+              <a:defRPr sz="2700"/>
+            </a:lvl3pPr>
+            <a:lvl4pPr marL="2057400" indent="0" algn="ctr">
+              <a:buNone/>
               <a:defRPr sz="2400"/>
-            </a:lvl1pPr>
-            <a:lvl2pPr marL="457200" indent="0" algn="ctr">
+            </a:lvl4pPr>
+            <a:lvl5pPr marL="2743200" indent="0" algn="ctr">
               <a:buNone/>
-              <a:defRPr sz="2000"/>
-            </a:lvl2pPr>
-            <a:lvl3pPr marL="914400" indent="0" algn="ctr">
+              <a:defRPr sz="2400"/>
+            </a:lvl5pPr>
+            <a:lvl6pPr marL="3429000" indent="0" algn="ctr">
               <a:buNone/>
-              <a:defRPr sz="1800"/>
-            </a:lvl3pPr>
-            <a:lvl4pPr marL="1371600" indent="0" algn="ctr">
+              <a:defRPr sz="2400"/>
+            </a:lvl6pPr>
+            <a:lvl7pPr marL="4114800" indent="0" algn="ctr">
               <a:buNone/>
-              <a:defRPr sz="1600"/>
-            </a:lvl4pPr>
-            <a:lvl5pPr marL="1828800" indent="0" algn="ctr">
+              <a:defRPr sz="2400"/>
+            </a:lvl7pPr>
+            <a:lvl8pPr marL="4800600" indent="0" algn="ctr">
               <a:buNone/>
-              <a:defRPr sz="1600"/>
-            </a:lvl5pPr>
-            <a:lvl6pPr marL="2286000" indent="0" algn="ctr">
+              <a:defRPr sz="2400"/>
+            </a:lvl8pPr>
+            <a:lvl9pPr marL="5486400" indent="0" algn="ctr">
               <a:buNone/>
-              <a:defRPr sz="1600"/>
-            </a:lvl6pPr>
-            <a:lvl7pPr marL="2743200" indent="0" algn="ctr">
-              <a:buNone/>
-              <a:defRPr sz="1600"/>
-            </a:lvl7pPr>
-            <a:lvl8pPr marL="3200400" indent="0" algn="ctr">
-              <a:buNone/>
-              <a:defRPr sz="1600"/>
-            </a:lvl8pPr>
-            <a:lvl9pPr marL="3657600" indent="0" algn="ctr">
-              <a:buNone/>
-              <a:defRPr sz="1600"/>
+              <a:defRPr sz="2400"/>
             </a:lvl9pPr>
           </a:lstStyle>
           <a:p>
@@ -237,18 +226,13 @@
               <a:rPr lang="en-US"/>
               <a:t>Click to edit Master subtitle style</a:t>
             </a:r>
-          </a:p>
-        </p:txBody>
-      </p:sp>
-      <p:sp>
-        <p:nvSpPr>
-          <p:cNvPr id="4" name="Date Placeholder 3">
-            <a:extLst>
-              <a:ext uri="{FF2B5EF4-FFF2-40B4-BE49-F238E27FC236}">
-                <a16:creationId xmlns:a16="http://schemas.microsoft.com/office/drawing/2014/main" id="{ABE0F3E7-A4FB-FEC8-7692-2AD9077F21A1}"/>
-              </a:ext>
-            </a:extLst>
-          </p:cNvPr>
+            <a:endParaRPr lang="en-US" dirty="0"/>
+          </a:p>
+        </p:txBody>
+      </p:sp>
+      <p:sp>
+        <p:nvSpPr>
+          <p:cNvPr id="4" name="Date Placeholder 3"/>
           <p:cNvSpPr>
             <a:spLocks noGrp="1"/>
           </p:cNvSpPr>
@@ -263,7 +247,7 @@
           <a:p>
             <a:fld id="{68BE3505-B0F7-4A6F-AFA4-B6981E8353AB}" type="datetimeFigureOut">
               <a:rPr lang="en-US" smtClean="0"/>
-              <a:t>3/28/2023</a:t>
+              <a:t>3/30/2023</a:t>
             </a:fld>
             <a:endParaRPr lang="en-US"/>
           </a:p>
@@ -271,13 +255,7 @@
       </p:sp>
       <p:sp>
         <p:nvSpPr>
-          <p:cNvPr id="5" name="Footer Placeholder 4">
-            <a:extLst>
-              <a:ext uri="{FF2B5EF4-FFF2-40B4-BE49-F238E27FC236}">
-                <a16:creationId xmlns:a16="http://schemas.microsoft.com/office/drawing/2014/main" id="{D0D3CCE4-0D14-69FD-4CEB-FCB053164095}"/>
-              </a:ext>
-            </a:extLst>
-          </p:cNvPr>
+          <p:cNvPr id="5" name="Footer Placeholder 4"/>
           <p:cNvSpPr>
             <a:spLocks noGrp="1"/>
           </p:cNvSpPr>
@@ -296,13 +274,7 @@
       </p:sp>
       <p:sp>
         <p:nvSpPr>
-          <p:cNvPr id="6" name="Slide Number Placeholder 5">
-            <a:extLst>
-              <a:ext uri="{FF2B5EF4-FFF2-40B4-BE49-F238E27FC236}">
-                <a16:creationId xmlns:a16="http://schemas.microsoft.com/office/drawing/2014/main" id="{554DE3E3-E90B-DCF5-AB36-6D8ADF93B188}"/>
-              </a:ext>
-            </a:extLst>
-          </p:cNvPr>
+          <p:cNvPr id="6" name="Slide Number Placeholder 5"/>
           <p:cNvSpPr>
             <a:spLocks noGrp="1"/>
           </p:cNvSpPr>
@@ -326,7 +298,7 @@
     </p:spTree>
     <p:extLst>
       <p:ext uri="{BB962C8B-B14F-4D97-AF65-F5344CB8AC3E}">
-        <p14:creationId xmlns:p14="http://schemas.microsoft.com/office/powerpoint/2010/main" val="3238558437"/>
+        <p14:creationId xmlns:p14="http://schemas.microsoft.com/office/powerpoint/2010/main" val="140102605"/>
       </p:ext>
     </p:extLst>
   </p:cSld>
@@ -355,13 +327,7 @@
       </p:grpSpPr>
       <p:sp>
         <p:nvSpPr>
-          <p:cNvPr id="2" name="Title 1">
-            <a:extLst>
-              <a:ext uri="{FF2B5EF4-FFF2-40B4-BE49-F238E27FC236}">
-                <a16:creationId xmlns:a16="http://schemas.microsoft.com/office/drawing/2014/main" id="{49A7BDF3-7630-AFBA-3272-A8ED7B2A53B7}"/>
-              </a:ext>
-            </a:extLst>
-          </p:cNvPr>
+          <p:cNvPr id="2" name="Title 1"/>
           <p:cNvSpPr>
             <a:spLocks noGrp="1"/>
           </p:cNvSpPr>
@@ -378,18 +344,13 @@
               <a:rPr lang="en-US"/>
               <a:t>Click to edit Master title style</a:t>
             </a:r>
-          </a:p>
-        </p:txBody>
-      </p:sp>
-      <p:sp>
-        <p:nvSpPr>
-          <p:cNvPr id="3" name="Vertical Text Placeholder 2">
-            <a:extLst>
-              <a:ext uri="{FF2B5EF4-FFF2-40B4-BE49-F238E27FC236}">
-                <a16:creationId xmlns:a16="http://schemas.microsoft.com/office/drawing/2014/main" id="{EB6B65EF-96F7-B497-BF99-4CB01544B5C8}"/>
-              </a:ext>
-            </a:extLst>
-          </p:cNvPr>
+            <a:endParaRPr lang="en-US" dirty="0"/>
+          </a:p>
+        </p:txBody>
+      </p:sp>
+      <p:sp>
+        <p:nvSpPr>
+          <p:cNvPr id="3" name="Vertical Text Placeholder 2"/>
           <p:cNvSpPr>
             <a:spLocks noGrp="1"/>
           </p:cNvSpPr>
@@ -435,18 +396,13 @@
               <a:rPr lang="en-US"/>
               <a:t>Fifth level</a:t>
             </a:r>
-          </a:p>
-        </p:txBody>
-      </p:sp>
-      <p:sp>
-        <p:nvSpPr>
-          <p:cNvPr id="4" name="Date Placeholder 3">
-            <a:extLst>
-              <a:ext uri="{FF2B5EF4-FFF2-40B4-BE49-F238E27FC236}">
-                <a16:creationId xmlns:a16="http://schemas.microsoft.com/office/drawing/2014/main" id="{788C3EE4-C8D2-2E57-CCD8-5472B2138B39}"/>
-              </a:ext>
-            </a:extLst>
-          </p:cNvPr>
+            <a:endParaRPr lang="en-US" dirty="0"/>
+          </a:p>
+        </p:txBody>
+      </p:sp>
+      <p:sp>
+        <p:nvSpPr>
+          <p:cNvPr id="4" name="Date Placeholder 3"/>
           <p:cNvSpPr>
             <a:spLocks noGrp="1"/>
           </p:cNvSpPr>
@@ -461,7 +417,7 @@
           <a:p>
             <a:fld id="{68BE3505-B0F7-4A6F-AFA4-B6981E8353AB}" type="datetimeFigureOut">
               <a:rPr lang="en-US" smtClean="0"/>
-              <a:t>3/28/2023</a:t>
+              <a:t>3/30/2023</a:t>
             </a:fld>
             <a:endParaRPr lang="en-US"/>
           </a:p>
@@ -469,13 +425,7 @@
       </p:sp>
       <p:sp>
         <p:nvSpPr>
-          <p:cNvPr id="5" name="Footer Placeholder 4">
-            <a:extLst>
-              <a:ext uri="{FF2B5EF4-FFF2-40B4-BE49-F238E27FC236}">
-                <a16:creationId xmlns:a16="http://schemas.microsoft.com/office/drawing/2014/main" id="{B3BEEB83-86C6-2073-3F37-8BFAB2D4E152}"/>
-              </a:ext>
-            </a:extLst>
-          </p:cNvPr>
+          <p:cNvPr id="5" name="Footer Placeholder 4"/>
           <p:cNvSpPr>
             <a:spLocks noGrp="1"/>
           </p:cNvSpPr>
@@ -494,13 +444,7 @@
       </p:sp>
       <p:sp>
         <p:nvSpPr>
-          <p:cNvPr id="6" name="Slide Number Placeholder 5">
-            <a:extLst>
-              <a:ext uri="{FF2B5EF4-FFF2-40B4-BE49-F238E27FC236}">
-                <a16:creationId xmlns:a16="http://schemas.microsoft.com/office/drawing/2014/main" id="{F027AC59-82F3-A759-914D-2E83BEADC84D}"/>
-              </a:ext>
-            </a:extLst>
-          </p:cNvPr>
+          <p:cNvPr id="6" name="Slide Number Placeholder 5"/>
           <p:cNvSpPr>
             <a:spLocks noGrp="1"/>
           </p:cNvSpPr>
@@ -524,7 +468,7 @@
     </p:spTree>
     <p:extLst>
       <p:ext uri="{BB962C8B-B14F-4D97-AF65-F5344CB8AC3E}">
-        <p14:creationId xmlns:p14="http://schemas.microsoft.com/office/powerpoint/2010/main" val="3406544538"/>
+        <p14:creationId xmlns:p14="http://schemas.microsoft.com/office/powerpoint/2010/main" val="3322810234"/>
       </p:ext>
     </p:extLst>
   </p:cSld>
@@ -553,13 +497,7 @@
       </p:grpSpPr>
       <p:sp>
         <p:nvSpPr>
-          <p:cNvPr id="2" name="Vertical Title 1">
-            <a:extLst>
-              <a:ext uri="{FF2B5EF4-FFF2-40B4-BE49-F238E27FC236}">
-                <a16:creationId xmlns:a16="http://schemas.microsoft.com/office/drawing/2014/main" id="{C69B1DAD-1EF8-77C7-C766-4321235ADEC0}"/>
-              </a:ext>
-            </a:extLst>
-          </p:cNvPr>
+          <p:cNvPr id="2" name="Vertical Title 1"/>
           <p:cNvSpPr>
             <a:spLocks noGrp="1"/>
           </p:cNvSpPr>
@@ -569,8 +507,8 @@
         </p:nvSpPr>
         <p:spPr>
           <a:xfrm>
-            <a:off x="8724900" y="365125"/>
-            <a:ext cx="2628900" cy="5811838"/>
+            <a:off x="9815513" y="730250"/>
+            <a:ext cx="2957513" cy="11623676"/>
           </a:xfrm>
         </p:spPr>
         <p:txBody>
@@ -581,18 +519,13 @@
               <a:rPr lang="en-US"/>
               <a:t>Click to edit Master title style</a:t>
             </a:r>
-          </a:p>
-        </p:txBody>
-      </p:sp>
-      <p:sp>
-        <p:nvSpPr>
-          <p:cNvPr id="3" name="Vertical Text Placeholder 2">
-            <a:extLst>
-              <a:ext uri="{FF2B5EF4-FFF2-40B4-BE49-F238E27FC236}">
-                <a16:creationId xmlns:a16="http://schemas.microsoft.com/office/drawing/2014/main" id="{D1A57917-E0AB-9722-FE99-54541ABC41A3}"/>
-              </a:ext>
-            </a:extLst>
-          </p:cNvPr>
+            <a:endParaRPr lang="en-US" dirty="0"/>
+          </a:p>
+        </p:txBody>
+      </p:sp>
+      <p:sp>
+        <p:nvSpPr>
+          <p:cNvPr id="3" name="Vertical Text Placeholder 2"/>
           <p:cNvSpPr>
             <a:spLocks noGrp="1"/>
           </p:cNvSpPr>
@@ -602,8 +535,8 @@
         </p:nvSpPr>
         <p:spPr>
           <a:xfrm>
-            <a:off x="838200" y="365125"/>
-            <a:ext cx="7734300" cy="5811838"/>
+            <a:off x="942976" y="730250"/>
+            <a:ext cx="8701088" cy="11623676"/>
           </a:xfrm>
         </p:spPr>
         <p:txBody>
@@ -643,18 +576,13 @@
               <a:rPr lang="en-US"/>
               <a:t>Fifth level</a:t>
             </a:r>
-          </a:p>
-        </p:txBody>
-      </p:sp>
-      <p:sp>
-        <p:nvSpPr>
-          <p:cNvPr id="4" name="Date Placeholder 3">
-            <a:extLst>
-              <a:ext uri="{FF2B5EF4-FFF2-40B4-BE49-F238E27FC236}">
-                <a16:creationId xmlns:a16="http://schemas.microsoft.com/office/drawing/2014/main" id="{C457CC8F-3DB3-D3E0-935F-4DD1FFE06868}"/>
-              </a:ext>
-            </a:extLst>
-          </p:cNvPr>
+            <a:endParaRPr lang="en-US" dirty="0"/>
+          </a:p>
+        </p:txBody>
+      </p:sp>
+      <p:sp>
+        <p:nvSpPr>
+          <p:cNvPr id="4" name="Date Placeholder 3"/>
           <p:cNvSpPr>
             <a:spLocks noGrp="1"/>
           </p:cNvSpPr>
@@ -669,7 +597,7 @@
           <a:p>
             <a:fld id="{68BE3505-B0F7-4A6F-AFA4-B6981E8353AB}" type="datetimeFigureOut">
               <a:rPr lang="en-US" smtClean="0"/>
-              <a:t>3/28/2023</a:t>
+              <a:t>3/30/2023</a:t>
             </a:fld>
             <a:endParaRPr lang="en-US"/>
           </a:p>
@@ -677,13 +605,7 @@
       </p:sp>
       <p:sp>
         <p:nvSpPr>
-          <p:cNvPr id="5" name="Footer Placeholder 4">
-            <a:extLst>
-              <a:ext uri="{FF2B5EF4-FFF2-40B4-BE49-F238E27FC236}">
-                <a16:creationId xmlns:a16="http://schemas.microsoft.com/office/drawing/2014/main" id="{42D57895-4D4A-031B-A496-DC232D160B52}"/>
-              </a:ext>
-            </a:extLst>
-          </p:cNvPr>
+          <p:cNvPr id="5" name="Footer Placeholder 4"/>
           <p:cNvSpPr>
             <a:spLocks noGrp="1"/>
           </p:cNvSpPr>
@@ -702,13 +624,7 @@
       </p:sp>
       <p:sp>
         <p:nvSpPr>
-          <p:cNvPr id="6" name="Slide Number Placeholder 5">
-            <a:extLst>
-              <a:ext uri="{FF2B5EF4-FFF2-40B4-BE49-F238E27FC236}">
-                <a16:creationId xmlns:a16="http://schemas.microsoft.com/office/drawing/2014/main" id="{1D5B5BBE-D0F8-458F-E312-849C5818659B}"/>
-              </a:ext>
-            </a:extLst>
-          </p:cNvPr>
+          <p:cNvPr id="6" name="Slide Number Placeholder 5"/>
           <p:cNvSpPr>
             <a:spLocks noGrp="1"/>
           </p:cNvSpPr>
@@ -732,7 +648,7 @@
     </p:spTree>
     <p:extLst>
       <p:ext uri="{BB962C8B-B14F-4D97-AF65-F5344CB8AC3E}">
-        <p14:creationId xmlns:p14="http://schemas.microsoft.com/office/powerpoint/2010/main" val="4073794475"/>
+        <p14:creationId xmlns:p14="http://schemas.microsoft.com/office/powerpoint/2010/main" val="594662128"/>
       </p:ext>
     </p:extLst>
   </p:cSld>
@@ -761,13 +677,7 @@
       </p:grpSpPr>
       <p:sp>
         <p:nvSpPr>
-          <p:cNvPr id="2" name="Title 1">
-            <a:extLst>
-              <a:ext uri="{FF2B5EF4-FFF2-40B4-BE49-F238E27FC236}">
-                <a16:creationId xmlns:a16="http://schemas.microsoft.com/office/drawing/2014/main" id="{9F493C22-5C10-AB87-6E45-85A2106A410B}"/>
-              </a:ext>
-            </a:extLst>
-          </p:cNvPr>
+          <p:cNvPr id="2" name="Title 1"/>
           <p:cNvSpPr>
             <a:spLocks noGrp="1"/>
           </p:cNvSpPr>
@@ -784,18 +694,13 @@
               <a:rPr lang="en-US"/>
               <a:t>Click to edit Master title style</a:t>
             </a:r>
-          </a:p>
-        </p:txBody>
-      </p:sp>
-      <p:sp>
-        <p:nvSpPr>
-          <p:cNvPr id="3" name="Content Placeholder 2">
-            <a:extLst>
-              <a:ext uri="{FF2B5EF4-FFF2-40B4-BE49-F238E27FC236}">
-                <a16:creationId xmlns:a16="http://schemas.microsoft.com/office/drawing/2014/main" id="{E7F66CDF-D9BC-7896-D0C1-76C026D5135E}"/>
-              </a:ext>
-            </a:extLst>
-          </p:cNvPr>
+            <a:endParaRPr lang="en-US" dirty="0"/>
+          </a:p>
+        </p:txBody>
+      </p:sp>
+      <p:sp>
+        <p:nvSpPr>
+          <p:cNvPr id="3" name="Content Placeholder 2"/>
           <p:cNvSpPr>
             <a:spLocks noGrp="1"/>
           </p:cNvSpPr>
@@ -841,18 +746,13 @@
               <a:rPr lang="en-US"/>
               <a:t>Fifth level</a:t>
             </a:r>
-          </a:p>
-        </p:txBody>
-      </p:sp>
-      <p:sp>
-        <p:nvSpPr>
-          <p:cNvPr id="4" name="Date Placeholder 3">
-            <a:extLst>
-              <a:ext uri="{FF2B5EF4-FFF2-40B4-BE49-F238E27FC236}">
-                <a16:creationId xmlns:a16="http://schemas.microsoft.com/office/drawing/2014/main" id="{D7D8DD48-1D6C-E2FD-C37F-854CD588F350}"/>
-              </a:ext>
-            </a:extLst>
-          </p:cNvPr>
+            <a:endParaRPr lang="en-US" dirty="0"/>
+          </a:p>
+        </p:txBody>
+      </p:sp>
+      <p:sp>
+        <p:nvSpPr>
+          <p:cNvPr id="4" name="Date Placeholder 3"/>
           <p:cNvSpPr>
             <a:spLocks noGrp="1"/>
           </p:cNvSpPr>
@@ -867,7 +767,7 @@
           <a:p>
             <a:fld id="{68BE3505-B0F7-4A6F-AFA4-B6981E8353AB}" type="datetimeFigureOut">
               <a:rPr lang="en-US" smtClean="0"/>
-              <a:t>3/28/2023</a:t>
+              <a:t>3/30/2023</a:t>
             </a:fld>
             <a:endParaRPr lang="en-US"/>
           </a:p>
@@ -875,13 +775,7 @@
       </p:sp>
       <p:sp>
         <p:nvSpPr>
-          <p:cNvPr id="5" name="Footer Placeholder 4">
-            <a:extLst>
-              <a:ext uri="{FF2B5EF4-FFF2-40B4-BE49-F238E27FC236}">
-                <a16:creationId xmlns:a16="http://schemas.microsoft.com/office/drawing/2014/main" id="{D2F4552F-1E8B-0132-FA07-9935FA110B50}"/>
-              </a:ext>
-            </a:extLst>
-          </p:cNvPr>
+          <p:cNvPr id="5" name="Footer Placeholder 4"/>
           <p:cNvSpPr>
             <a:spLocks noGrp="1"/>
           </p:cNvSpPr>
@@ -900,13 +794,7 @@
       </p:sp>
       <p:sp>
         <p:nvSpPr>
-          <p:cNvPr id="6" name="Slide Number Placeholder 5">
-            <a:extLst>
-              <a:ext uri="{FF2B5EF4-FFF2-40B4-BE49-F238E27FC236}">
-                <a16:creationId xmlns:a16="http://schemas.microsoft.com/office/drawing/2014/main" id="{90762051-28D1-967F-AA42-E9D907EAB056}"/>
-              </a:ext>
-            </a:extLst>
-          </p:cNvPr>
+          <p:cNvPr id="6" name="Slide Number Placeholder 5"/>
           <p:cNvSpPr>
             <a:spLocks noGrp="1"/>
           </p:cNvSpPr>
@@ -930,7 +818,7 @@
     </p:spTree>
     <p:extLst>
       <p:ext uri="{BB962C8B-B14F-4D97-AF65-F5344CB8AC3E}">
-        <p14:creationId xmlns:p14="http://schemas.microsoft.com/office/powerpoint/2010/main" val="2534778281"/>
+        <p14:creationId xmlns:p14="http://schemas.microsoft.com/office/powerpoint/2010/main" val="248603917"/>
       </p:ext>
     </p:extLst>
   </p:cSld>
@@ -959,13 +847,7 @@
       </p:grpSpPr>
       <p:sp>
         <p:nvSpPr>
-          <p:cNvPr id="2" name="Title 1">
-            <a:extLst>
-              <a:ext uri="{FF2B5EF4-FFF2-40B4-BE49-F238E27FC236}">
-                <a16:creationId xmlns:a16="http://schemas.microsoft.com/office/drawing/2014/main" id="{4C5440F5-F251-8363-B74A-475A54C3329E}"/>
-              </a:ext>
-            </a:extLst>
-          </p:cNvPr>
+          <p:cNvPr id="2" name="Title 1"/>
           <p:cNvSpPr>
             <a:spLocks noGrp="1"/>
           </p:cNvSpPr>
@@ -975,15 +857,15 @@
         </p:nvSpPr>
         <p:spPr>
           <a:xfrm>
-            <a:off x="831850" y="1709738"/>
-            <a:ext cx="10515600" cy="2852737"/>
+            <a:off x="935832" y="3419479"/>
+            <a:ext cx="11830050" cy="5705474"/>
           </a:xfrm>
         </p:spPr>
         <p:txBody>
           <a:bodyPr anchor="b"/>
           <a:lstStyle>
             <a:lvl1pPr>
-              <a:defRPr sz="6000"/>
+              <a:defRPr sz="9000"/>
             </a:lvl1pPr>
           </a:lstStyle>
           <a:p>
@@ -991,18 +873,13 @@
               <a:rPr lang="en-US"/>
               <a:t>Click to edit Master title style</a:t>
             </a:r>
-          </a:p>
-        </p:txBody>
-      </p:sp>
-      <p:sp>
-        <p:nvSpPr>
-          <p:cNvPr id="3" name="Text Placeholder 2">
-            <a:extLst>
-              <a:ext uri="{FF2B5EF4-FFF2-40B4-BE49-F238E27FC236}">
-                <a16:creationId xmlns:a16="http://schemas.microsoft.com/office/drawing/2014/main" id="{5DA0161F-321C-51E9-84EC-0C29AE45FF97}"/>
-              </a:ext>
-            </a:extLst>
-          </p:cNvPr>
+            <a:endParaRPr lang="en-US" dirty="0"/>
+          </a:p>
+        </p:txBody>
+      </p:sp>
+      <p:sp>
+        <p:nvSpPr>
+          <p:cNvPr id="3" name="Text Placeholder 2"/>
           <p:cNvSpPr>
             <a:spLocks noGrp="1"/>
           </p:cNvSpPr>
@@ -1012,14 +889,42 @@
         </p:nvSpPr>
         <p:spPr>
           <a:xfrm>
-            <a:off x="831850" y="4589463"/>
-            <a:ext cx="10515600" cy="1500187"/>
+            <a:off x="935832" y="9178929"/>
+            <a:ext cx="11830050" cy="3000374"/>
           </a:xfrm>
         </p:spPr>
         <p:txBody>
           <a:bodyPr/>
           <a:lstStyle>
             <a:lvl1pPr marL="0" indent="0">
+              <a:buNone/>
+              <a:defRPr sz="3600">
+                <a:solidFill>
+                  <a:schemeClr val="tx1"/>
+                </a:solidFill>
+              </a:defRPr>
+            </a:lvl1pPr>
+            <a:lvl2pPr marL="685800" indent="0">
+              <a:buNone/>
+              <a:defRPr sz="3000">
+                <a:solidFill>
+                  <a:schemeClr val="tx1">
+                    <a:tint val="75000"/>
+                  </a:schemeClr>
+                </a:solidFill>
+              </a:defRPr>
+            </a:lvl2pPr>
+            <a:lvl3pPr marL="1371600" indent="0">
+              <a:buNone/>
+              <a:defRPr sz="2700">
+                <a:solidFill>
+                  <a:schemeClr val="tx1">
+                    <a:tint val="75000"/>
+                  </a:schemeClr>
+                </a:solidFill>
+              </a:defRPr>
+            </a:lvl3pPr>
+            <a:lvl4pPr marL="2057400" indent="0">
               <a:buNone/>
               <a:defRPr sz="2400">
                 <a:solidFill>
@@ -1028,40 +933,10 @@
                   </a:schemeClr>
                 </a:solidFill>
               </a:defRPr>
-            </a:lvl1pPr>
-            <a:lvl2pPr marL="457200" indent="0">
+            </a:lvl4pPr>
+            <a:lvl5pPr marL="2743200" indent="0">
               <a:buNone/>
-              <a:defRPr sz="2000">
-                <a:solidFill>
-                  <a:schemeClr val="tx1">
-                    <a:tint val="75000"/>
-                  </a:schemeClr>
-                </a:solidFill>
-              </a:defRPr>
-            </a:lvl2pPr>
-            <a:lvl3pPr marL="914400" indent="0">
-              <a:buNone/>
-              <a:defRPr sz="1800">
-                <a:solidFill>
-                  <a:schemeClr val="tx1">
-                    <a:tint val="75000"/>
-                  </a:schemeClr>
-                </a:solidFill>
-              </a:defRPr>
-            </a:lvl3pPr>
-            <a:lvl4pPr marL="1371600" indent="0">
-              <a:buNone/>
-              <a:defRPr sz="1600">
-                <a:solidFill>
-                  <a:schemeClr val="tx1">
-                    <a:tint val="75000"/>
-                  </a:schemeClr>
-                </a:solidFill>
-              </a:defRPr>
-            </a:lvl4pPr>
-            <a:lvl5pPr marL="1828800" indent="0">
-              <a:buNone/>
-              <a:defRPr sz="1600">
+              <a:defRPr sz="2400">
                 <a:solidFill>
                   <a:schemeClr val="tx1">
                     <a:tint val="75000"/>
@@ -1069,9 +944,9 @@
                 </a:solidFill>
               </a:defRPr>
             </a:lvl5pPr>
-            <a:lvl6pPr marL="2286000" indent="0">
+            <a:lvl6pPr marL="3429000" indent="0">
               <a:buNone/>
-              <a:defRPr sz="1600">
+              <a:defRPr sz="2400">
                 <a:solidFill>
                   <a:schemeClr val="tx1">
                     <a:tint val="75000"/>
@@ -1079,9 +954,9 @@
                 </a:solidFill>
               </a:defRPr>
             </a:lvl6pPr>
-            <a:lvl7pPr marL="2743200" indent="0">
+            <a:lvl7pPr marL="4114800" indent="0">
               <a:buNone/>
-              <a:defRPr sz="1600">
+              <a:defRPr sz="2400">
                 <a:solidFill>
                   <a:schemeClr val="tx1">
                     <a:tint val="75000"/>
@@ -1089,9 +964,9 @@
                 </a:solidFill>
               </a:defRPr>
             </a:lvl7pPr>
-            <a:lvl8pPr marL="3200400" indent="0">
+            <a:lvl8pPr marL="4800600" indent="0">
               <a:buNone/>
-              <a:defRPr sz="1600">
+              <a:defRPr sz="2400">
                 <a:solidFill>
                   <a:schemeClr val="tx1">
                     <a:tint val="75000"/>
@@ -1099,9 +974,9 @@
                 </a:solidFill>
               </a:defRPr>
             </a:lvl8pPr>
-            <a:lvl9pPr marL="3657600" indent="0">
+            <a:lvl9pPr marL="5486400" indent="0">
               <a:buNone/>
-              <a:defRPr sz="1600">
+              <a:defRPr sz="2400">
                 <a:solidFill>
                   <a:schemeClr val="tx1">
                     <a:tint val="75000"/>
@@ -1121,13 +996,7 @@
       </p:sp>
       <p:sp>
         <p:nvSpPr>
-          <p:cNvPr id="4" name="Date Placeholder 3">
-            <a:extLst>
-              <a:ext uri="{FF2B5EF4-FFF2-40B4-BE49-F238E27FC236}">
-                <a16:creationId xmlns:a16="http://schemas.microsoft.com/office/drawing/2014/main" id="{8CF527CF-FA51-892A-C449-AC1CE1E41371}"/>
-              </a:ext>
-            </a:extLst>
-          </p:cNvPr>
+          <p:cNvPr id="4" name="Date Placeholder 3"/>
           <p:cNvSpPr>
             <a:spLocks noGrp="1"/>
           </p:cNvSpPr>
@@ -1142,7 +1011,7 @@
           <a:p>
             <a:fld id="{68BE3505-B0F7-4A6F-AFA4-B6981E8353AB}" type="datetimeFigureOut">
               <a:rPr lang="en-US" smtClean="0"/>
-              <a:t>3/28/2023</a:t>
+              <a:t>3/30/2023</a:t>
             </a:fld>
             <a:endParaRPr lang="en-US"/>
           </a:p>
@@ -1150,13 +1019,7 @@
       </p:sp>
       <p:sp>
         <p:nvSpPr>
-          <p:cNvPr id="5" name="Footer Placeholder 4">
-            <a:extLst>
-              <a:ext uri="{FF2B5EF4-FFF2-40B4-BE49-F238E27FC236}">
-                <a16:creationId xmlns:a16="http://schemas.microsoft.com/office/drawing/2014/main" id="{1F9A436C-D045-A254-774B-D79E51837AE3}"/>
-              </a:ext>
-            </a:extLst>
-          </p:cNvPr>
+          <p:cNvPr id="5" name="Footer Placeholder 4"/>
           <p:cNvSpPr>
             <a:spLocks noGrp="1"/>
           </p:cNvSpPr>
@@ -1175,13 +1038,7 @@
       </p:sp>
       <p:sp>
         <p:nvSpPr>
-          <p:cNvPr id="6" name="Slide Number Placeholder 5">
-            <a:extLst>
-              <a:ext uri="{FF2B5EF4-FFF2-40B4-BE49-F238E27FC236}">
-                <a16:creationId xmlns:a16="http://schemas.microsoft.com/office/drawing/2014/main" id="{6542CEC1-DC2A-251D-F799-C15F4F23B2F7}"/>
-              </a:ext>
-            </a:extLst>
-          </p:cNvPr>
+          <p:cNvPr id="6" name="Slide Number Placeholder 5"/>
           <p:cNvSpPr>
             <a:spLocks noGrp="1"/>
           </p:cNvSpPr>
@@ -1205,7 +1062,7 @@
     </p:spTree>
     <p:extLst>
       <p:ext uri="{BB962C8B-B14F-4D97-AF65-F5344CB8AC3E}">
-        <p14:creationId xmlns:p14="http://schemas.microsoft.com/office/powerpoint/2010/main" val="3490702945"/>
+        <p14:creationId xmlns:p14="http://schemas.microsoft.com/office/powerpoint/2010/main" val="708080949"/>
       </p:ext>
     </p:extLst>
   </p:cSld>
@@ -1234,13 +1091,7 @@
       </p:grpSpPr>
       <p:sp>
         <p:nvSpPr>
-          <p:cNvPr id="2" name="Title 1">
-            <a:extLst>
-              <a:ext uri="{FF2B5EF4-FFF2-40B4-BE49-F238E27FC236}">
-                <a16:creationId xmlns:a16="http://schemas.microsoft.com/office/drawing/2014/main" id="{872EBB8F-006E-C01A-99A7-F24299521086}"/>
-              </a:ext>
-            </a:extLst>
-          </p:cNvPr>
+          <p:cNvPr id="2" name="Title 1"/>
           <p:cNvSpPr>
             <a:spLocks noGrp="1"/>
           </p:cNvSpPr>
@@ -1257,18 +1108,13 @@
               <a:rPr lang="en-US"/>
               <a:t>Click to edit Master title style</a:t>
             </a:r>
-          </a:p>
-        </p:txBody>
-      </p:sp>
-      <p:sp>
-        <p:nvSpPr>
-          <p:cNvPr id="3" name="Content Placeholder 2">
-            <a:extLst>
-              <a:ext uri="{FF2B5EF4-FFF2-40B4-BE49-F238E27FC236}">
-                <a16:creationId xmlns:a16="http://schemas.microsoft.com/office/drawing/2014/main" id="{5F64E7BD-347D-25F3-75F3-D598E449D209}"/>
-              </a:ext>
-            </a:extLst>
-          </p:cNvPr>
+            <a:endParaRPr lang="en-US" dirty="0"/>
+          </a:p>
+        </p:txBody>
+      </p:sp>
+      <p:sp>
+        <p:nvSpPr>
+          <p:cNvPr id="3" name="Content Placeholder 2"/>
           <p:cNvSpPr>
             <a:spLocks noGrp="1"/>
           </p:cNvSpPr>
@@ -1278,8 +1124,8 @@
         </p:nvSpPr>
         <p:spPr>
           <a:xfrm>
-            <a:off x="838200" y="1825625"/>
-            <a:ext cx="5181600" cy="4351338"/>
+            <a:off x="942975" y="3651250"/>
+            <a:ext cx="5829300" cy="8702676"/>
           </a:xfrm>
         </p:spPr>
         <p:txBody>
@@ -1319,18 +1165,13 @@
               <a:rPr lang="en-US"/>
               <a:t>Fifth level</a:t>
             </a:r>
-          </a:p>
-        </p:txBody>
-      </p:sp>
-      <p:sp>
-        <p:nvSpPr>
-          <p:cNvPr id="4" name="Content Placeholder 3">
-            <a:extLst>
-              <a:ext uri="{FF2B5EF4-FFF2-40B4-BE49-F238E27FC236}">
-                <a16:creationId xmlns:a16="http://schemas.microsoft.com/office/drawing/2014/main" id="{A3944F97-B991-DCC1-C388-CA341FC2DBE1}"/>
-              </a:ext>
-            </a:extLst>
-          </p:cNvPr>
+            <a:endParaRPr lang="en-US" dirty="0"/>
+          </a:p>
+        </p:txBody>
+      </p:sp>
+      <p:sp>
+        <p:nvSpPr>
+          <p:cNvPr id="4" name="Content Placeholder 3"/>
           <p:cNvSpPr>
             <a:spLocks noGrp="1"/>
           </p:cNvSpPr>
@@ -1340,8 +1181,8 @@
         </p:nvSpPr>
         <p:spPr>
           <a:xfrm>
-            <a:off x="6172200" y="1825625"/>
-            <a:ext cx="5181600" cy="4351338"/>
+            <a:off x="6943725" y="3651250"/>
+            <a:ext cx="5829300" cy="8702676"/>
           </a:xfrm>
         </p:spPr>
         <p:txBody>
@@ -1381,18 +1222,13 @@
               <a:rPr lang="en-US"/>
               <a:t>Fifth level</a:t>
             </a:r>
-          </a:p>
-        </p:txBody>
-      </p:sp>
-      <p:sp>
-        <p:nvSpPr>
-          <p:cNvPr id="5" name="Date Placeholder 4">
-            <a:extLst>
-              <a:ext uri="{FF2B5EF4-FFF2-40B4-BE49-F238E27FC236}">
-                <a16:creationId xmlns:a16="http://schemas.microsoft.com/office/drawing/2014/main" id="{D595F6EE-1071-2A9E-890C-AF9881660FD7}"/>
-              </a:ext>
-            </a:extLst>
-          </p:cNvPr>
+            <a:endParaRPr lang="en-US" dirty="0"/>
+          </a:p>
+        </p:txBody>
+      </p:sp>
+      <p:sp>
+        <p:nvSpPr>
+          <p:cNvPr id="5" name="Date Placeholder 4"/>
           <p:cNvSpPr>
             <a:spLocks noGrp="1"/>
           </p:cNvSpPr>
@@ -1407,7 +1243,7 @@
           <a:p>
             <a:fld id="{68BE3505-B0F7-4A6F-AFA4-B6981E8353AB}" type="datetimeFigureOut">
               <a:rPr lang="en-US" smtClean="0"/>
-              <a:t>3/28/2023</a:t>
+              <a:t>3/30/2023</a:t>
             </a:fld>
             <a:endParaRPr lang="en-US"/>
           </a:p>
@@ -1415,13 +1251,7 @@
       </p:sp>
       <p:sp>
         <p:nvSpPr>
-          <p:cNvPr id="6" name="Footer Placeholder 5">
-            <a:extLst>
-              <a:ext uri="{FF2B5EF4-FFF2-40B4-BE49-F238E27FC236}">
-                <a16:creationId xmlns:a16="http://schemas.microsoft.com/office/drawing/2014/main" id="{8834D3B5-F695-5A23-1FEA-AE5551AD8D39}"/>
-              </a:ext>
-            </a:extLst>
-          </p:cNvPr>
+          <p:cNvPr id="6" name="Footer Placeholder 5"/>
           <p:cNvSpPr>
             <a:spLocks noGrp="1"/>
           </p:cNvSpPr>
@@ -1440,13 +1270,7 @@
       </p:sp>
       <p:sp>
         <p:nvSpPr>
-          <p:cNvPr id="7" name="Slide Number Placeholder 6">
-            <a:extLst>
-              <a:ext uri="{FF2B5EF4-FFF2-40B4-BE49-F238E27FC236}">
-                <a16:creationId xmlns:a16="http://schemas.microsoft.com/office/drawing/2014/main" id="{CB71306F-CEED-5E94-1880-9D007A4D3C96}"/>
-              </a:ext>
-            </a:extLst>
-          </p:cNvPr>
+          <p:cNvPr id="7" name="Slide Number Placeholder 6"/>
           <p:cNvSpPr>
             <a:spLocks noGrp="1"/>
           </p:cNvSpPr>
@@ -1470,7 +1294,7 @@
     </p:spTree>
     <p:extLst>
       <p:ext uri="{BB962C8B-B14F-4D97-AF65-F5344CB8AC3E}">
-        <p14:creationId xmlns:p14="http://schemas.microsoft.com/office/powerpoint/2010/main" val="1207610340"/>
+        <p14:creationId xmlns:p14="http://schemas.microsoft.com/office/powerpoint/2010/main" val="291393059"/>
       </p:ext>
     </p:extLst>
   </p:cSld>
@@ -1499,13 +1323,7 @@
       </p:grpSpPr>
       <p:sp>
         <p:nvSpPr>
-          <p:cNvPr id="2" name="Title 1">
-            <a:extLst>
-              <a:ext uri="{FF2B5EF4-FFF2-40B4-BE49-F238E27FC236}">
-                <a16:creationId xmlns:a16="http://schemas.microsoft.com/office/drawing/2014/main" id="{31EE946F-EC4B-B76C-C20C-FCADBF8EC2B9}"/>
-              </a:ext>
-            </a:extLst>
-          </p:cNvPr>
+          <p:cNvPr id="2" name="Title 1"/>
           <p:cNvSpPr>
             <a:spLocks noGrp="1"/>
           </p:cNvSpPr>
@@ -1515,8 +1333,8 @@
         </p:nvSpPr>
         <p:spPr>
           <a:xfrm>
-            <a:off x="839788" y="365125"/>
-            <a:ext cx="10515600" cy="1325563"/>
+            <a:off x="944762" y="730253"/>
+            <a:ext cx="11830050" cy="2651126"/>
           </a:xfrm>
         </p:spPr>
         <p:txBody>
@@ -1527,18 +1345,13 @@
               <a:rPr lang="en-US"/>
               <a:t>Click to edit Master title style</a:t>
             </a:r>
-          </a:p>
-        </p:txBody>
-      </p:sp>
-      <p:sp>
-        <p:nvSpPr>
-          <p:cNvPr id="3" name="Text Placeholder 2">
-            <a:extLst>
-              <a:ext uri="{FF2B5EF4-FFF2-40B4-BE49-F238E27FC236}">
-                <a16:creationId xmlns:a16="http://schemas.microsoft.com/office/drawing/2014/main" id="{48A95800-995B-6698-15D4-55FADEA50B49}"/>
-              </a:ext>
-            </a:extLst>
-          </p:cNvPr>
+            <a:endParaRPr lang="en-US" dirty="0"/>
+          </a:p>
+        </p:txBody>
+      </p:sp>
+      <p:sp>
+        <p:nvSpPr>
+          <p:cNvPr id="3" name="Text Placeholder 2"/>
           <p:cNvSpPr>
             <a:spLocks noGrp="1"/>
           </p:cNvSpPr>
@@ -1548,8 +1361,8 @@
         </p:nvSpPr>
         <p:spPr>
           <a:xfrm>
-            <a:off x="839788" y="1681163"/>
-            <a:ext cx="5157787" cy="823912"/>
+            <a:off x="944763" y="3362326"/>
+            <a:ext cx="5802510" cy="1647824"/>
           </a:xfrm>
         </p:spPr>
         <p:txBody>
@@ -1557,39 +1370,39 @@
           <a:lstStyle>
             <a:lvl1pPr marL="0" indent="0">
               <a:buNone/>
+              <a:defRPr sz="3600" b="1"/>
+            </a:lvl1pPr>
+            <a:lvl2pPr marL="685800" indent="0">
+              <a:buNone/>
+              <a:defRPr sz="3000" b="1"/>
+            </a:lvl2pPr>
+            <a:lvl3pPr marL="1371600" indent="0">
+              <a:buNone/>
+              <a:defRPr sz="2700" b="1"/>
+            </a:lvl3pPr>
+            <a:lvl4pPr marL="2057400" indent="0">
+              <a:buNone/>
               <a:defRPr sz="2400" b="1"/>
-            </a:lvl1pPr>
-            <a:lvl2pPr marL="457200" indent="0">
+            </a:lvl4pPr>
+            <a:lvl5pPr marL="2743200" indent="0">
               <a:buNone/>
-              <a:defRPr sz="2000" b="1"/>
-            </a:lvl2pPr>
-            <a:lvl3pPr marL="914400" indent="0">
+              <a:defRPr sz="2400" b="1"/>
+            </a:lvl5pPr>
+            <a:lvl6pPr marL="3429000" indent="0">
               <a:buNone/>
-              <a:defRPr sz="1800" b="1"/>
-            </a:lvl3pPr>
-            <a:lvl4pPr marL="1371600" indent="0">
+              <a:defRPr sz="2400" b="1"/>
+            </a:lvl6pPr>
+            <a:lvl7pPr marL="4114800" indent="0">
               <a:buNone/>
-              <a:defRPr sz="1600" b="1"/>
-            </a:lvl4pPr>
-            <a:lvl5pPr marL="1828800" indent="0">
+              <a:defRPr sz="2400" b="1"/>
+            </a:lvl7pPr>
+            <a:lvl8pPr marL="4800600" indent="0">
               <a:buNone/>
-              <a:defRPr sz="1600" b="1"/>
-            </a:lvl5pPr>
-            <a:lvl6pPr marL="2286000" indent="0">
+              <a:defRPr sz="2400" b="1"/>
+            </a:lvl8pPr>
+            <a:lvl9pPr marL="5486400" indent="0">
               <a:buNone/>
-              <a:defRPr sz="1600" b="1"/>
-            </a:lvl6pPr>
-            <a:lvl7pPr marL="2743200" indent="0">
-              <a:buNone/>
-              <a:defRPr sz="1600" b="1"/>
-            </a:lvl7pPr>
-            <a:lvl8pPr marL="3200400" indent="0">
-              <a:buNone/>
-              <a:defRPr sz="1600" b="1"/>
-            </a:lvl8pPr>
-            <a:lvl9pPr marL="3657600" indent="0">
-              <a:buNone/>
-              <a:defRPr sz="1600" b="1"/>
+              <a:defRPr sz="2400" b="1"/>
             </a:lvl9pPr>
           </a:lstStyle>
           <a:p>
@@ -1603,13 +1416,7 @@
       </p:sp>
       <p:sp>
         <p:nvSpPr>
-          <p:cNvPr id="4" name="Content Placeholder 3">
-            <a:extLst>
-              <a:ext uri="{FF2B5EF4-FFF2-40B4-BE49-F238E27FC236}">
-                <a16:creationId xmlns:a16="http://schemas.microsoft.com/office/drawing/2014/main" id="{2CAF9458-0657-3056-7951-198E5C718D38}"/>
-              </a:ext>
-            </a:extLst>
-          </p:cNvPr>
+          <p:cNvPr id="4" name="Content Placeholder 3"/>
           <p:cNvSpPr>
             <a:spLocks noGrp="1"/>
           </p:cNvSpPr>
@@ -1619,8 +1426,8 @@
         </p:nvSpPr>
         <p:spPr>
           <a:xfrm>
-            <a:off x="839788" y="2505075"/>
-            <a:ext cx="5157787" cy="3684588"/>
+            <a:off x="944763" y="5010150"/>
+            <a:ext cx="5802510" cy="7369176"/>
           </a:xfrm>
         </p:spPr>
         <p:txBody>
@@ -1660,18 +1467,13 @@
               <a:rPr lang="en-US"/>
               <a:t>Fifth level</a:t>
             </a:r>
-          </a:p>
-        </p:txBody>
-      </p:sp>
-      <p:sp>
-        <p:nvSpPr>
-          <p:cNvPr id="5" name="Text Placeholder 4">
-            <a:extLst>
-              <a:ext uri="{FF2B5EF4-FFF2-40B4-BE49-F238E27FC236}">
-                <a16:creationId xmlns:a16="http://schemas.microsoft.com/office/drawing/2014/main" id="{4C7549F5-E720-40C7-473C-7910AB1BDDC9}"/>
-              </a:ext>
-            </a:extLst>
-          </p:cNvPr>
+            <a:endParaRPr lang="en-US" dirty="0"/>
+          </a:p>
+        </p:txBody>
+      </p:sp>
+      <p:sp>
+        <p:nvSpPr>
+          <p:cNvPr id="5" name="Text Placeholder 4"/>
           <p:cNvSpPr>
             <a:spLocks noGrp="1"/>
           </p:cNvSpPr>
@@ -1681,8 +1483,8 @@
         </p:nvSpPr>
         <p:spPr>
           <a:xfrm>
-            <a:off x="6172200" y="1681163"/>
-            <a:ext cx="5183188" cy="823912"/>
+            <a:off x="6943726" y="3362326"/>
+            <a:ext cx="5831087" cy="1647824"/>
           </a:xfrm>
         </p:spPr>
         <p:txBody>
@@ -1690,39 +1492,39 @@
           <a:lstStyle>
             <a:lvl1pPr marL="0" indent="0">
               <a:buNone/>
+              <a:defRPr sz="3600" b="1"/>
+            </a:lvl1pPr>
+            <a:lvl2pPr marL="685800" indent="0">
+              <a:buNone/>
+              <a:defRPr sz="3000" b="1"/>
+            </a:lvl2pPr>
+            <a:lvl3pPr marL="1371600" indent="0">
+              <a:buNone/>
+              <a:defRPr sz="2700" b="1"/>
+            </a:lvl3pPr>
+            <a:lvl4pPr marL="2057400" indent="0">
+              <a:buNone/>
               <a:defRPr sz="2400" b="1"/>
-            </a:lvl1pPr>
-            <a:lvl2pPr marL="457200" indent="0">
+            </a:lvl4pPr>
+            <a:lvl5pPr marL="2743200" indent="0">
               <a:buNone/>
-              <a:defRPr sz="2000" b="1"/>
-            </a:lvl2pPr>
-            <a:lvl3pPr marL="914400" indent="0">
+              <a:defRPr sz="2400" b="1"/>
+            </a:lvl5pPr>
+            <a:lvl6pPr marL="3429000" indent="0">
               <a:buNone/>
-              <a:defRPr sz="1800" b="1"/>
-            </a:lvl3pPr>
-            <a:lvl4pPr marL="1371600" indent="0">
+              <a:defRPr sz="2400" b="1"/>
+            </a:lvl6pPr>
+            <a:lvl7pPr marL="4114800" indent="0">
               <a:buNone/>
-              <a:defRPr sz="1600" b="1"/>
-            </a:lvl4pPr>
-            <a:lvl5pPr marL="1828800" indent="0">
+              <a:defRPr sz="2400" b="1"/>
+            </a:lvl7pPr>
+            <a:lvl8pPr marL="4800600" indent="0">
               <a:buNone/>
-              <a:defRPr sz="1600" b="1"/>
-            </a:lvl5pPr>
-            <a:lvl6pPr marL="2286000" indent="0">
+              <a:defRPr sz="2400" b="1"/>
+            </a:lvl8pPr>
+            <a:lvl9pPr marL="5486400" indent="0">
               <a:buNone/>
-              <a:defRPr sz="1600" b="1"/>
-            </a:lvl6pPr>
-            <a:lvl7pPr marL="2743200" indent="0">
-              <a:buNone/>
-              <a:defRPr sz="1600" b="1"/>
-            </a:lvl7pPr>
-            <a:lvl8pPr marL="3200400" indent="0">
-              <a:buNone/>
-              <a:defRPr sz="1600" b="1"/>
-            </a:lvl8pPr>
-            <a:lvl9pPr marL="3657600" indent="0">
-              <a:buNone/>
-              <a:defRPr sz="1600" b="1"/>
+              <a:defRPr sz="2400" b="1"/>
             </a:lvl9pPr>
           </a:lstStyle>
           <a:p>
@@ -1736,13 +1538,7 @@
       </p:sp>
       <p:sp>
         <p:nvSpPr>
-          <p:cNvPr id="6" name="Content Placeholder 5">
-            <a:extLst>
-              <a:ext uri="{FF2B5EF4-FFF2-40B4-BE49-F238E27FC236}">
-                <a16:creationId xmlns:a16="http://schemas.microsoft.com/office/drawing/2014/main" id="{46580EFE-E749-AE26-1892-5F475327FAB6}"/>
-              </a:ext>
-            </a:extLst>
-          </p:cNvPr>
+          <p:cNvPr id="6" name="Content Placeholder 5"/>
           <p:cNvSpPr>
             <a:spLocks noGrp="1"/>
           </p:cNvSpPr>
@@ -1752,8 +1548,8 @@
         </p:nvSpPr>
         <p:spPr>
           <a:xfrm>
-            <a:off x="6172200" y="2505075"/>
-            <a:ext cx="5183188" cy="3684588"/>
+            <a:off x="6943726" y="5010150"/>
+            <a:ext cx="5831087" cy="7369176"/>
           </a:xfrm>
         </p:spPr>
         <p:txBody>
@@ -1793,18 +1589,13 @@
               <a:rPr lang="en-US"/>
               <a:t>Fifth level</a:t>
             </a:r>
-          </a:p>
-        </p:txBody>
-      </p:sp>
-      <p:sp>
-        <p:nvSpPr>
-          <p:cNvPr id="7" name="Date Placeholder 6">
-            <a:extLst>
-              <a:ext uri="{FF2B5EF4-FFF2-40B4-BE49-F238E27FC236}">
-                <a16:creationId xmlns:a16="http://schemas.microsoft.com/office/drawing/2014/main" id="{EF63F640-3D73-C22F-8BA7-CF1063F96A71}"/>
-              </a:ext>
-            </a:extLst>
-          </p:cNvPr>
+            <a:endParaRPr lang="en-US" dirty="0"/>
+          </a:p>
+        </p:txBody>
+      </p:sp>
+      <p:sp>
+        <p:nvSpPr>
+          <p:cNvPr id="7" name="Date Placeholder 6"/>
           <p:cNvSpPr>
             <a:spLocks noGrp="1"/>
           </p:cNvSpPr>
@@ -1819,7 +1610,7 @@
           <a:p>
             <a:fld id="{68BE3505-B0F7-4A6F-AFA4-B6981E8353AB}" type="datetimeFigureOut">
               <a:rPr lang="en-US" smtClean="0"/>
-              <a:t>3/28/2023</a:t>
+              <a:t>3/30/2023</a:t>
             </a:fld>
             <a:endParaRPr lang="en-US"/>
           </a:p>
@@ -1827,13 +1618,7 @@
       </p:sp>
       <p:sp>
         <p:nvSpPr>
-          <p:cNvPr id="8" name="Footer Placeholder 7">
-            <a:extLst>
-              <a:ext uri="{FF2B5EF4-FFF2-40B4-BE49-F238E27FC236}">
-                <a16:creationId xmlns:a16="http://schemas.microsoft.com/office/drawing/2014/main" id="{CCCA2BE7-A039-5616-87F3-5ED2F6E9E87F}"/>
-              </a:ext>
-            </a:extLst>
-          </p:cNvPr>
+          <p:cNvPr id="8" name="Footer Placeholder 7"/>
           <p:cNvSpPr>
             <a:spLocks noGrp="1"/>
           </p:cNvSpPr>
@@ -1852,13 +1637,7 @@
       </p:sp>
       <p:sp>
         <p:nvSpPr>
-          <p:cNvPr id="9" name="Slide Number Placeholder 8">
-            <a:extLst>
-              <a:ext uri="{FF2B5EF4-FFF2-40B4-BE49-F238E27FC236}">
-                <a16:creationId xmlns:a16="http://schemas.microsoft.com/office/drawing/2014/main" id="{F1CC9FFA-758C-6D01-E93F-B842BBC72420}"/>
-              </a:ext>
-            </a:extLst>
-          </p:cNvPr>
+          <p:cNvPr id="9" name="Slide Number Placeholder 8"/>
           <p:cNvSpPr>
             <a:spLocks noGrp="1"/>
           </p:cNvSpPr>
@@ -1882,7 +1661,7 @@
     </p:spTree>
     <p:extLst>
       <p:ext uri="{BB962C8B-B14F-4D97-AF65-F5344CB8AC3E}">
-        <p14:creationId xmlns:p14="http://schemas.microsoft.com/office/powerpoint/2010/main" val="2946526509"/>
+        <p14:creationId xmlns:p14="http://schemas.microsoft.com/office/powerpoint/2010/main" val="2827376589"/>
       </p:ext>
     </p:extLst>
   </p:cSld>
@@ -1911,13 +1690,7 @@
       </p:grpSpPr>
       <p:sp>
         <p:nvSpPr>
-          <p:cNvPr id="2" name="Title 1">
-            <a:extLst>
-              <a:ext uri="{FF2B5EF4-FFF2-40B4-BE49-F238E27FC236}">
-                <a16:creationId xmlns:a16="http://schemas.microsoft.com/office/drawing/2014/main" id="{9B579695-0081-CFF4-FEEB-FBEEC6BD3B76}"/>
-              </a:ext>
-            </a:extLst>
-          </p:cNvPr>
+          <p:cNvPr id="2" name="Title 1"/>
           <p:cNvSpPr>
             <a:spLocks noGrp="1"/>
           </p:cNvSpPr>
@@ -1934,18 +1707,13 @@
               <a:rPr lang="en-US"/>
               <a:t>Click to edit Master title style</a:t>
             </a:r>
-          </a:p>
-        </p:txBody>
-      </p:sp>
-      <p:sp>
-        <p:nvSpPr>
-          <p:cNvPr id="3" name="Date Placeholder 2">
-            <a:extLst>
-              <a:ext uri="{FF2B5EF4-FFF2-40B4-BE49-F238E27FC236}">
-                <a16:creationId xmlns:a16="http://schemas.microsoft.com/office/drawing/2014/main" id="{C438D283-5E30-4FDD-26D4-2A2B644E51F7}"/>
-              </a:ext>
-            </a:extLst>
-          </p:cNvPr>
+            <a:endParaRPr lang="en-US" dirty="0"/>
+          </a:p>
+        </p:txBody>
+      </p:sp>
+      <p:sp>
+        <p:nvSpPr>
+          <p:cNvPr id="3" name="Date Placeholder 2"/>
           <p:cNvSpPr>
             <a:spLocks noGrp="1"/>
           </p:cNvSpPr>
@@ -1960,7 +1728,7 @@
           <a:p>
             <a:fld id="{68BE3505-B0F7-4A6F-AFA4-B6981E8353AB}" type="datetimeFigureOut">
               <a:rPr lang="en-US" smtClean="0"/>
-              <a:t>3/28/2023</a:t>
+              <a:t>3/30/2023</a:t>
             </a:fld>
             <a:endParaRPr lang="en-US"/>
           </a:p>
@@ -1968,13 +1736,7 @@
       </p:sp>
       <p:sp>
         <p:nvSpPr>
-          <p:cNvPr id="4" name="Footer Placeholder 3">
-            <a:extLst>
-              <a:ext uri="{FF2B5EF4-FFF2-40B4-BE49-F238E27FC236}">
-                <a16:creationId xmlns:a16="http://schemas.microsoft.com/office/drawing/2014/main" id="{F7713309-B175-36D0-21A1-88BE703F2E74}"/>
-              </a:ext>
-            </a:extLst>
-          </p:cNvPr>
+          <p:cNvPr id="4" name="Footer Placeholder 3"/>
           <p:cNvSpPr>
             <a:spLocks noGrp="1"/>
           </p:cNvSpPr>
@@ -1993,13 +1755,7 @@
       </p:sp>
       <p:sp>
         <p:nvSpPr>
-          <p:cNvPr id="5" name="Slide Number Placeholder 4">
-            <a:extLst>
-              <a:ext uri="{FF2B5EF4-FFF2-40B4-BE49-F238E27FC236}">
-                <a16:creationId xmlns:a16="http://schemas.microsoft.com/office/drawing/2014/main" id="{584D97C9-FCAC-12A1-653A-93B44018B213}"/>
-              </a:ext>
-            </a:extLst>
-          </p:cNvPr>
+          <p:cNvPr id="5" name="Slide Number Placeholder 4"/>
           <p:cNvSpPr>
             <a:spLocks noGrp="1"/>
           </p:cNvSpPr>
@@ -2023,7 +1779,7 @@
     </p:spTree>
     <p:extLst>
       <p:ext uri="{BB962C8B-B14F-4D97-AF65-F5344CB8AC3E}">
-        <p14:creationId xmlns:p14="http://schemas.microsoft.com/office/powerpoint/2010/main" val="193159764"/>
+        <p14:creationId xmlns:p14="http://schemas.microsoft.com/office/powerpoint/2010/main" val="3929953186"/>
       </p:ext>
     </p:extLst>
   </p:cSld>
@@ -2052,13 +1808,7 @@
       </p:grpSpPr>
       <p:sp>
         <p:nvSpPr>
-          <p:cNvPr id="2" name="Date Placeholder 1">
-            <a:extLst>
-              <a:ext uri="{FF2B5EF4-FFF2-40B4-BE49-F238E27FC236}">
-                <a16:creationId xmlns:a16="http://schemas.microsoft.com/office/drawing/2014/main" id="{431FD1AD-9DC6-6ED3-B3F3-A6EDC7079DA9}"/>
-              </a:ext>
-            </a:extLst>
-          </p:cNvPr>
+          <p:cNvPr id="2" name="Date Placeholder 1"/>
           <p:cNvSpPr>
             <a:spLocks noGrp="1"/>
           </p:cNvSpPr>
@@ -2073,7 +1823,7 @@
           <a:p>
             <a:fld id="{68BE3505-B0F7-4A6F-AFA4-B6981E8353AB}" type="datetimeFigureOut">
               <a:rPr lang="en-US" smtClean="0"/>
-              <a:t>3/28/2023</a:t>
+              <a:t>3/30/2023</a:t>
             </a:fld>
             <a:endParaRPr lang="en-US"/>
           </a:p>
@@ -2081,13 +1831,7 @@
       </p:sp>
       <p:sp>
         <p:nvSpPr>
-          <p:cNvPr id="3" name="Footer Placeholder 2">
-            <a:extLst>
-              <a:ext uri="{FF2B5EF4-FFF2-40B4-BE49-F238E27FC236}">
-                <a16:creationId xmlns:a16="http://schemas.microsoft.com/office/drawing/2014/main" id="{DF64FB06-8E53-ABF9-D876-E2C73F4EC1E4}"/>
-              </a:ext>
-            </a:extLst>
-          </p:cNvPr>
+          <p:cNvPr id="3" name="Footer Placeholder 2"/>
           <p:cNvSpPr>
             <a:spLocks noGrp="1"/>
           </p:cNvSpPr>
@@ -2106,13 +1850,7 @@
       </p:sp>
       <p:sp>
         <p:nvSpPr>
-          <p:cNvPr id="4" name="Slide Number Placeholder 3">
-            <a:extLst>
-              <a:ext uri="{FF2B5EF4-FFF2-40B4-BE49-F238E27FC236}">
-                <a16:creationId xmlns:a16="http://schemas.microsoft.com/office/drawing/2014/main" id="{E9EDA4AA-0082-0F90-E70C-02C39652A620}"/>
-              </a:ext>
-            </a:extLst>
-          </p:cNvPr>
+          <p:cNvPr id="4" name="Slide Number Placeholder 3"/>
           <p:cNvSpPr>
             <a:spLocks noGrp="1"/>
           </p:cNvSpPr>
@@ -2136,7 +1874,7 @@
     </p:spTree>
     <p:extLst>
       <p:ext uri="{BB962C8B-B14F-4D97-AF65-F5344CB8AC3E}">
-        <p14:creationId xmlns:p14="http://schemas.microsoft.com/office/powerpoint/2010/main" val="2911926209"/>
+        <p14:creationId xmlns:p14="http://schemas.microsoft.com/office/powerpoint/2010/main" val="3527321579"/>
       </p:ext>
     </p:extLst>
   </p:cSld>
@@ -2165,13 +1903,7 @@
       </p:grpSpPr>
       <p:sp>
         <p:nvSpPr>
-          <p:cNvPr id="2" name="Title 1">
-            <a:extLst>
-              <a:ext uri="{FF2B5EF4-FFF2-40B4-BE49-F238E27FC236}">
-                <a16:creationId xmlns:a16="http://schemas.microsoft.com/office/drawing/2014/main" id="{C13E43A5-B2D1-F7F3-C027-A8107F72A50A}"/>
-              </a:ext>
-            </a:extLst>
-          </p:cNvPr>
+          <p:cNvPr id="2" name="Title 1"/>
           <p:cNvSpPr>
             <a:spLocks noGrp="1"/>
           </p:cNvSpPr>
@@ -2181,15 +1913,15 @@
         </p:nvSpPr>
         <p:spPr>
           <a:xfrm>
-            <a:off x="839788" y="457200"/>
-            <a:ext cx="3932237" cy="1600200"/>
+            <a:off x="944762" y="914400"/>
+            <a:ext cx="4423767" cy="3200400"/>
           </a:xfrm>
         </p:spPr>
         <p:txBody>
           <a:bodyPr anchor="b"/>
           <a:lstStyle>
             <a:lvl1pPr>
-              <a:defRPr sz="3200"/>
+              <a:defRPr sz="4800"/>
             </a:lvl1pPr>
           </a:lstStyle>
           <a:p>
@@ -2197,18 +1929,13 @@
               <a:rPr lang="en-US"/>
               <a:t>Click to edit Master title style</a:t>
             </a:r>
-          </a:p>
-        </p:txBody>
-      </p:sp>
-      <p:sp>
-        <p:nvSpPr>
-          <p:cNvPr id="3" name="Content Placeholder 2">
-            <a:extLst>
-              <a:ext uri="{FF2B5EF4-FFF2-40B4-BE49-F238E27FC236}">
-                <a16:creationId xmlns:a16="http://schemas.microsoft.com/office/drawing/2014/main" id="{189ABB59-6F23-8783-821F-E4082F474AC4}"/>
-              </a:ext>
-            </a:extLst>
-          </p:cNvPr>
+            <a:endParaRPr lang="en-US" dirty="0"/>
+          </a:p>
+        </p:txBody>
+      </p:sp>
+      <p:sp>
+        <p:nvSpPr>
+          <p:cNvPr id="3" name="Content Placeholder 2"/>
           <p:cNvSpPr>
             <a:spLocks noGrp="1"/>
           </p:cNvSpPr>
@@ -2218,39 +1945,39 @@
         </p:nvSpPr>
         <p:spPr>
           <a:xfrm>
-            <a:off x="5183188" y="987425"/>
-            <a:ext cx="6172200" cy="4873625"/>
+            <a:off x="5831087" y="1974853"/>
+            <a:ext cx="6943725" cy="9747250"/>
           </a:xfrm>
         </p:spPr>
         <p:txBody>
           <a:bodyPr/>
           <a:lstStyle>
             <a:lvl1pPr>
-              <a:defRPr sz="3200"/>
+              <a:defRPr sz="4800"/>
             </a:lvl1pPr>
             <a:lvl2pPr>
-              <a:defRPr sz="2800"/>
+              <a:defRPr sz="4200"/>
             </a:lvl2pPr>
             <a:lvl3pPr>
-              <a:defRPr sz="2400"/>
+              <a:defRPr sz="3600"/>
             </a:lvl3pPr>
             <a:lvl4pPr>
-              <a:defRPr sz="2000"/>
+              <a:defRPr sz="3000"/>
             </a:lvl4pPr>
             <a:lvl5pPr>
-              <a:defRPr sz="2000"/>
+              <a:defRPr sz="3000"/>
             </a:lvl5pPr>
             <a:lvl6pPr>
-              <a:defRPr sz="2000"/>
+              <a:defRPr sz="3000"/>
             </a:lvl6pPr>
             <a:lvl7pPr>
-              <a:defRPr sz="2000"/>
+              <a:defRPr sz="3000"/>
             </a:lvl7pPr>
             <a:lvl8pPr>
-              <a:defRPr sz="2000"/>
+              <a:defRPr sz="3000"/>
             </a:lvl8pPr>
             <a:lvl9pPr>
-              <a:defRPr sz="2000"/>
+              <a:defRPr sz="3000"/>
             </a:lvl9pPr>
           </a:lstStyle>
           <a:p>
@@ -2287,18 +2014,13 @@
               <a:rPr lang="en-US"/>
               <a:t>Fifth level</a:t>
             </a:r>
-          </a:p>
-        </p:txBody>
-      </p:sp>
-      <p:sp>
-        <p:nvSpPr>
-          <p:cNvPr id="4" name="Text Placeholder 3">
-            <a:extLst>
-              <a:ext uri="{FF2B5EF4-FFF2-40B4-BE49-F238E27FC236}">
-                <a16:creationId xmlns:a16="http://schemas.microsoft.com/office/drawing/2014/main" id="{D28A61B1-907E-BCC1-B147-7D83FBDC5923}"/>
-              </a:ext>
-            </a:extLst>
-          </p:cNvPr>
+            <a:endParaRPr lang="en-US" dirty="0"/>
+          </a:p>
+        </p:txBody>
+      </p:sp>
+      <p:sp>
+        <p:nvSpPr>
+          <p:cNvPr id="4" name="Text Placeholder 3"/>
           <p:cNvSpPr>
             <a:spLocks noGrp="1"/>
           </p:cNvSpPr>
@@ -2308,8 +2030,8 @@
         </p:nvSpPr>
         <p:spPr>
           <a:xfrm>
-            <a:off x="839788" y="2057400"/>
-            <a:ext cx="3932237" cy="3811588"/>
+            <a:off x="944762" y="4114800"/>
+            <a:ext cx="4423767" cy="7623176"/>
           </a:xfrm>
         </p:spPr>
         <p:txBody>
@@ -2317,39 +2039,39 @@
           <a:lstStyle>
             <a:lvl1pPr marL="0" indent="0">
               <a:buNone/>
-              <a:defRPr sz="1600"/>
+              <a:defRPr sz="2400"/>
             </a:lvl1pPr>
-            <a:lvl2pPr marL="457200" indent="0">
+            <a:lvl2pPr marL="685800" indent="0">
               <a:buNone/>
-              <a:defRPr sz="1400"/>
+              <a:defRPr sz="2100"/>
             </a:lvl2pPr>
-            <a:lvl3pPr marL="914400" indent="0">
+            <a:lvl3pPr marL="1371600" indent="0">
               <a:buNone/>
-              <a:defRPr sz="1200"/>
+              <a:defRPr sz="1800"/>
             </a:lvl3pPr>
-            <a:lvl4pPr marL="1371600" indent="0">
+            <a:lvl4pPr marL="2057400" indent="0">
               <a:buNone/>
-              <a:defRPr sz="1000"/>
+              <a:defRPr sz="1500"/>
             </a:lvl4pPr>
-            <a:lvl5pPr marL="1828800" indent="0">
+            <a:lvl5pPr marL="2743200" indent="0">
               <a:buNone/>
-              <a:defRPr sz="1000"/>
+              <a:defRPr sz="1500"/>
             </a:lvl5pPr>
-            <a:lvl6pPr marL="2286000" indent="0">
+            <a:lvl6pPr marL="3429000" indent="0">
               <a:buNone/>
-              <a:defRPr sz="1000"/>
+              <a:defRPr sz="1500"/>
             </a:lvl6pPr>
-            <a:lvl7pPr marL="2743200" indent="0">
+            <a:lvl7pPr marL="4114800" indent="0">
               <a:buNone/>
-              <a:defRPr sz="1000"/>
+              <a:defRPr sz="1500"/>
             </a:lvl7pPr>
-            <a:lvl8pPr marL="3200400" indent="0">
+            <a:lvl8pPr marL="4800600" indent="0">
               <a:buNone/>
-              <a:defRPr sz="1000"/>
+              <a:defRPr sz="1500"/>
             </a:lvl8pPr>
-            <a:lvl9pPr marL="3657600" indent="0">
+            <a:lvl9pPr marL="5486400" indent="0">
               <a:buNone/>
-              <a:defRPr sz="1000"/>
+              <a:defRPr sz="1500"/>
             </a:lvl9pPr>
           </a:lstStyle>
           <a:p>
@@ -2363,13 +2085,7 @@
       </p:sp>
       <p:sp>
         <p:nvSpPr>
-          <p:cNvPr id="5" name="Date Placeholder 4">
-            <a:extLst>
-              <a:ext uri="{FF2B5EF4-FFF2-40B4-BE49-F238E27FC236}">
-                <a16:creationId xmlns:a16="http://schemas.microsoft.com/office/drawing/2014/main" id="{F208D08E-9D1F-870B-9704-E76FEE91E09D}"/>
-              </a:ext>
-            </a:extLst>
-          </p:cNvPr>
+          <p:cNvPr id="5" name="Date Placeholder 4"/>
           <p:cNvSpPr>
             <a:spLocks noGrp="1"/>
           </p:cNvSpPr>
@@ -2384,7 +2100,7 @@
           <a:p>
             <a:fld id="{68BE3505-B0F7-4A6F-AFA4-B6981E8353AB}" type="datetimeFigureOut">
               <a:rPr lang="en-US" smtClean="0"/>
-              <a:t>3/28/2023</a:t>
+              <a:t>3/30/2023</a:t>
             </a:fld>
             <a:endParaRPr lang="en-US"/>
           </a:p>
@@ -2392,13 +2108,7 @@
       </p:sp>
       <p:sp>
         <p:nvSpPr>
-          <p:cNvPr id="6" name="Footer Placeholder 5">
-            <a:extLst>
-              <a:ext uri="{FF2B5EF4-FFF2-40B4-BE49-F238E27FC236}">
-                <a16:creationId xmlns:a16="http://schemas.microsoft.com/office/drawing/2014/main" id="{170D9C78-089E-29EF-9E92-51821E34065F}"/>
-              </a:ext>
-            </a:extLst>
-          </p:cNvPr>
+          <p:cNvPr id="6" name="Footer Placeholder 5"/>
           <p:cNvSpPr>
             <a:spLocks noGrp="1"/>
           </p:cNvSpPr>
@@ -2417,13 +2127,7 @@
       </p:sp>
       <p:sp>
         <p:nvSpPr>
-          <p:cNvPr id="7" name="Slide Number Placeholder 6">
-            <a:extLst>
-              <a:ext uri="{FF2B5EF4-FFF2-40B4-BE49-F238E27FC236}">
-                <a16:creationId xmlns:a16="http://schemas.microsoft.com/office/drawing/2014/main" id="{A964FACB-0098-83DC-324C-D94517578541}"/>
-              </a:ext>
-            </a:extLst>
-          </p:cNvPr>
+          <p:cNvPr id="7" name="Slide Number Placeholder 6"/>
           <p:cNvSpPr>
             <a:spLocks noGrp="1"/>
           </p:cNvSpPr>
@@ -2447,7 +2151,7 @@
     </p:spTree>
     <p:extLst>
       <p:ext uri="{BB962C8B-B14F-4D97-AF65-F5344CB8AC3E}">
-        <p14:creationId xmlns:p14="http://schemas.microsoft.com/office/powerpoint/2010/main" val="2102046451"/>
+        <p14:creationId xmlns:p14="http://schemas.microsoft.com/office/powerpoint/2010/main" val="1391266555"/>
       </p:ext>
     </p:extLst>
   </p:cSld>
@@ -2476,13 +2180,7 @@
       </p:grpSpPr>
       <p:sp>
         <p:nvSpPr>
-          <p:cNvPr id="2" name="Title 1">
-            <a:extLst>
-              <a:ext uri="{FF2B5EF4-FFF2-40B4-BE49-F238E27FC236}">
-                <a16:creationId xmlns:a16="http://schemas.microsoft.com/office/drawing/2014/main" id="{239A41FE-C536-061E-D891-A6604100D0F2}"/>
-              </a:ext>
-            </a:extLst>
-          </p:cNvPr>
+          <p:cNvPr id="2" name="Title 1"/>
           <p:cNvSpPr>
             <a:spLocks noGrp="1"/>
           </p:cNvSpPr>
@@ -2492,15 +2190,15 @@
         </p:nvSpPr>
         <p:spPr>
           <a:xfrm>
-            <a:off x="839788" y="457200"/>
-            <a:ext cx="3932237" cy="1600200"/>
+            <a:off x="944762" y="914400"/>
+            <a:ext cx="4423767" cy="3200400"/>
           </a:xfrm>
         </p:spPr>
         <p:txBody>
           <a:bodyPr anchor="b"/>
           <a:lstStyle>
             <a:lvl1pPr>
-              <a:defRPr sz="3200"/>
+              <a:defRPr sz="4800"/>
             </a:lvl1pPr>
           </a:lstStyle>
           <a:p>
@@ -2508,20 +2206,15 @@
               <a:rPr lang="en-US"/>
               <a:t>Click to edit Master title style</a:t>
             </a:r>
-          </a:p>
-        </p:txBody>
-      </p:sp>
-      <p:sp>
-        <p:nvSpPr>
-          <p:cNvPr id="3" name="Picture Placeholder 2">
-            <a:extLst>
-              <a:ext uri="{FF2B5EF4-FFF2-40B4-BE49-F238E27FC236}">
-                <a16:creationId xmlns:a16="http://schemas.microsoft.com/office/drawing/2014/main" id="{E54D2A7F-81E2-200B-CA11-5E0F983CCACD}"/>
-              </a:ext>
-            </a:extLst>
-          </p:cNvPr>
+            <a:endParaRPr lang="en-US" dirty="0"/>
+          </a:p>
+        </p:txBody>
+      </p:sp>
+      <p:sp>
+        <p:nvSpPr>
+          <p:cNvPr id="3" name="Picture Placeholder 2"/>
           <p:cNvSpPr>
-            <a:spLocks noGrp="1"/>
+            <a:spLocks noGrp="1" noChangeAspect="1"/>
           </p:cNvSpPr>
           <p:nvPr>
             <p:ph type="pic" idx="1"/>
@@ -2529,64 +2222,62 @@
         </p:nvSpPr>
         <p:spPr>
           <a:xfrm>
-            <a:off x="5183188" y="987425"/>
-            <a:ext cx="6172200" cy="4873625"/>
+            <a:off x="5831087" y="1974853"/>
+            <a:ext cx="6943725" cy="9747250"/>
           </a:xfrm>
         </p:spPr>
         <p:txBody>
-          <a:bodyPr/>
+          <a:bodyPr anchor="t"/>
           <a:lstStyle>
             <a:lvl1pPr marL="0" indent="0">
               <a:buNone/>
-              <a:defRPr sz="3200"/>
+              <a:defRPr sz="4800"/>
             </a:lvl1pPr>
-            <a:lvl2pPr marL="457200" indent="0">
+            <a:lvl2pPr marL="685800" indent="0">
               <a:buNone/>
-              <a:defRPr sz="2800"/>
+              <a:defRPr sz="4200"/>
             </a:lvl2pPr>
-            <a:lvl3pPr marL="914400" indent="0">
+            <a:lvl3pPr marL="1371600" indent="0">
               <a:buNone/>
-              <a:defRPr sz="2400"/>
+              <a:defRPr sz="3600"/>
             </a:lvl3pPr>
-            <a:lvl4pPr marL="1371600" indent="0">
+            <a:lvl4pPr marL="2057400" indent="0">
               <a:buNone/>
-              <a:defRPr sz="2000"/>
+              <a:defRPr sz="3000"/>
             </a:lvl4pPr>
-            <a:lvl5pPr marL="1828800" indent="0">
+            <a:lvl5pPr marL="2743200" indent="0">
               <a:buNone/>
-              <a:defRPr sz="2000"/>
+              <a:defRPr sz="3000"/>
             </a:lvl5pPr>
-            <a:lvl6pPr marL="2286000" indent="0">
+            <a:lvl6pPr marL="3429000" indent="0">
               <a:buNone/>
-              <a:defRPr sz="2000"/>
+              <a:defRPr sz="3000"/>
             </a:lvl6pPr>
-            <a:lvl7pPr marL="2743200" indent="0">
+            <a:lvl7pPr marL="4114800" indent="0">
               <a:buNone/>
-              <a:defRPr sz="2000"/>
+              <a:defRPr sz="3000"/>
             </a:lvl7pPr>
-            <a:lvl8pPr marL="3200400" indent="0">
+            <a:lvl8pPr marL="4800600" indent="0">
               <a:buNone/>
-              <a:defRPr sz="2000"/>
+              <a:defRPr sz="3000"/>
             </a:lvl8pPr>
-            <a:lvl9pPr marL="3657600" indent="0">
+            <a:lvl9pPr marL="5486400" indent="0">
               <a:buNone/>
-              <a:defRPr sz="2000"/>
+              <a:defRPr sz="3000"/>
             </a:lvl9pPr>
           </a:lstStyle>
           <a:p>
-            <a:endParaRPr lang="en-US"/>
-          </a:p>
-        </p:txBody>
-      </p:sp>
-      <p:sp>
-        <p:nvSpPr>
-          <p:cNvPr id="4" name="Text Placeholder 3">
-            <a:extLst>
-              <a:ext uri="{FF2B5EF4-FFF2-40B4-BE49-F238E27FC236}">
-                <a16:creationId xmlns:a16="http://schemas.microsoft.com/office/drawing/2014/main" id="{02C566A4-9BE5-69B6-BC77-CF2236729A25}"/>
-              </a:ext>
-            </a:extLst>
-          </p:cNvPr>
+            <a:r>
+              <a:rPr lang="en-US"/>
+              <a:t>Click icon to add picture</a:t>
+            </a:r>
+            <a:endParaRPr lang="en-US" dirty="0"/>
+          </a:p>
+        </p:txBody>
+      </p:sp>
+      <p:sp>
+        <p:nvSpPr>
+          <p:cNvPr id="4" name="Text Placeholder 3"/>
           <p:cNvSpPr>
             <a:spLocks noGrp="1"/>
           </p:cNvSpPr>
@@ -2596,8 +2287,8 @@
         </p:nvSpPr>
         <p:spPr>
           <a:xfrm>
-            <a:off x="839788" y="2057400"/>
-            <a:ext cx="3932237" cy="3811588"/>
+            <a:off x="944762" y="4114800"/>
+            <a:ext cx="4423767" cy="7623176"/>
           </a:xfrm>
         </p:spPr>
         <p:txBody>
@@ -2605,39 +2296,39 @@
           <a:lstStyle>
             <a:lvl1pPr marL="0" indent="0">
               <a:buNone/>
-              <a:defRPr sz="1600"/>
+              <a:defRPr sz="2400"/>
             </a:lvl1pPr>
-            <a:lvl2pPr marL="457200" indent="0">
+            <a:lvl2pPr marL="685800" indent="0">
               <a:buNone/>
-              <a:defRPr sz="1400"/>
+              <a:defRPr sz="2100"/>
             </a:lvl2pPr>
-            <a:lvl3pPr marL="914400" indent="0">
+            <a:lvl3pPr marL="1371600" indent="0">
               <a:buNone/>
-              <a:defRPr sz="1200"/>
+              <a:defRPr sz="1800"/>
             </a:lvl3pPr>
-            <a:lvl4pPr marL="1371600" indent="0">
+            <a:lvl4pPr marL="2057400" indent="0">
               <a:buNone/>
-              <a:defRPr sz="1000"/>
+              <a:defRPr sz="1500"/>
             </a:lvl4pPr>
-            <a:lvl5pPr marL="1828800" indent="0">
+            <a:lvl5pPr marL="2743200" indent="0">
               <a:buNone/>
-              <a:defRPr sz="1000"/>
+              <a:defRPr sz="1500"/>
             </a:lvl5pPr>
-            <a:lvl6pPr marL="2286000" indent="0">
+            <a:lvl6pPr marL="3429000" indent="0">
               <a:buNone/>
-              <a:defRPr sz="1000"/>
+              <a:defRPr sz="1500"/>
             </a:lvl6pPr>
-            <a:lvl7pPr marL="2743200" indent="0">
+            <a:lvl7pPr marL="4114800" indent="0">
               <a:buNone/>
-              <a:defRPr sz="1000"/>
+              <a:defRPr sz="1500"/>
             </a:lvl7pPr>
-            <a:lvl8pPr marL="3200400" indent="0">
+            <a:lvl8pPr marL="4800600" indent="0">
               <a:buNone/>
-              <a:defRPr sz="1000"/>
+              <a:defRPr sz="1500"/>
             </a:lvl8pPr>
-            <a:lvl9pPr marL="3657600" indent="0">
+            <a:lvl9pPr marL="5486400" indent="0">
               <a:buNone/>
-              <a:defRPr sz="1000"/>
+              <a:defRPr sz="1500"/>
             </a:lvl9pPr>
           </a:lstStyle>
           <a:p>
@@ -2651,13 +2342,7 @@
       </p:sp>
       <p:sp>
         <p:nvSpPr>
-          <p:cNvPr id="5" name="Date Placeholder 4">
-            <a:extLst>
-              <a:ext uri="{FF2B5EF4-FFF2-40B4-BE49-F238E27FC236}">
-                <a16:creationId xmlns:a16="http://schemas.microsoft.com/office/drawing/2014/main" id="{E35665E5-EF60-DAF1-DCC0-A6441AF1AC66}"/>
-              </a:ext>
-            </a:extLst>
-          </p:cNvPr>
+          <p:cNvPr id="5" name="Date Placeholder 4"/>
           <p:cNvSpPr>
             <a:spLocks noGrp="1"/>
           </p:cNvSpPr>
@@ -2672,7 +2357,7 @@
           <a:p>
             <a:fld id="{68BE3505-B0F7-4A6F-AFA4-B6981E8353AB}" type="datetimeFigureOut">
               <a:rPr lang="en-US" smtClean="0"/>
-              <a:t>3/28/2023</a:t>
+              <a:t>3/30/2023</a:t>
             </a:fld>
             <a:endParaRPr lang="en-US"/>
           </a:p>
@@ -2680,13 +2365,7 @@
       </p:sp>
       <p:sp>
         <p:nvSpPr>
-          <p:cNvPr id="6" name="Footer Placeholder 5">
-            <a:extLst>
-              <a:ext uri="{FF2B5EF4-FFF2-40B4-BE49-F238E27FC236}">
-                <a16:creationId xmlns:a16="http://schemas.microsoft.com/office/drawing/2014/main" id="{FD9411B5-FB1C-9ACD-44E8-A715BDFEB6E8}"/>
-              </a:ext>
-            </a:extLst>
-          </p:cNvPr>
+          <p:cNvPr id="6" name="Footer Placeholder 5"/>
           <p:cNvSpPr>
             <a:spLocks noGrp="1"/>
           </p:cNvSpPr>
@@ -2705,13 +2384,7 @@
       </p:sp>
       <p:sp>
         <p:nvSpPr>
-          <p:cNvPr id="7" name="Slide Number Placeholder 6">
-            <a:extLst>
-              <a:ext uri="{FF2B5EF4-FFF2-40B4-BE49-F238E27FC236}">
-                <a16:creationId xmlns:a16="http://schemas.microsoft.com/office/drawing/2014/main" id="{8BC3E0F5-1561-5BE5-25F2-85844FB01B8E}"/>
-              </a:ext>
-            </a:extLst>
-          </p:cNvPr>
+          <p:cNvPr id="7" name="Slide Number Placeholder 6"/>
           <p:cNvSpPr>
             <a:spLocks noGrp="1"/>
           </p:cNvSpPr>
@@ -2735,7 +2408,7 @@
     </p:spTree>
     <p:extLst>
       <p:ext uri="{BB962C8B-B14F-4D97-AF65-F5344CB8AC3E}">
-        <p14:creationId xmlns:p14="http://schemas.microsoft.com/office/powerpoint/2010/main" val="1056696197"/>
+        <p14:creationId xmlns:p14="http://schemas.microsoft.com/office/powerpoint/2010/main" val="3361393316"/>
       </p:ext>
     </p:extLst>
   </p:cSld>
@@ -2769,13 +2442,7 @@
       </p:grpSpPr>
       <p:sp>
         <p:nvSpPr>
-          <p:cNvPr id="2" name="Title Placeholder 1">
-            <a:extLst>
-              <a:ext uri="{FF2B5EF4-FFF2-40B4-BE49-F238E27FC236}">
-                <a16:creationId xmlns:a16="http://schemas.microsoft.com/office/drawing/2014/main" id="{4F7F3C4B-E1EF-0DEF-CC89-08615FDC46BB}"/>
-              </a:ext>
-            </a:extLst>
-          </p:cNvPr>
+          <p:cNvPr id="2" name="Title Placeholder 1"/>
           <p:cNvSpPr>
             <a:spLocks noGrp="1"/>
           </p:cNvSpPr>
@@ -2785,8 +2452,8 @@
         </p:nvSpPr>
         <p:spPr>
           <a:xfrm>
-            <a:off x="838200" y="365125"/>
-            <a:ext cx="10515600" cy="1325563"/>
+            <a:off x="942975" y="730253"/>
+            <a:ext cx="11830050" cy="2651126"/>
           </a:xfrm>
           <a:prstGeom prst="rect">
             <a:avLst/>
@@ -2802,18 +2469,13 @@
               <a:rPr lang="en-US"/>
               <a:t>Click to edit Master title style</a:t>
             </a:r>
-          </a:p>
-        </p:txBody>
-      </p:sp>
-      <p:sp>
-        <p:nvSpPr>
-          <p:cNvPr id="3" name="Text Placeholder 2">
-            <a:extLst>
-              <a:ext uri="{FF2B5EF4-FFF2-40B4-BE49-F238E27FC236}">
-                <a16:creationId xmlns:a16="http://schemas.microsoft.com/office/drawing/2014/main" id="{C6C33200-753A-2747-07D2-24A118FC9974}"/>
-              </a:ext>
-            </a:extLst>
-          </p:cNvPr>
+            <a:endParaRPr lang="en-US" dirty="0"/>
+          </a:p>
+        </p:txBody>
+      </p:sp>
+      <p:sp>
+        <p:nvSpPr>
+          <p:cNvPr id="3" name="Text Placeholder 2"/>
           <p:cNvSpPr>
             <a:spLocks noGrp="1"/>
           </p:cNvSpPr>
@@ -2823,8 +2485,8 @@
         </p:nvSpPr>
         <p:spPr>
           <a:xfrm>
-            <a:off x="838200" y="1825625"/>
-            <a:ext cx="10515600" cy="4351338"/>
+            <a:off x="942975" y="3651250"/>
+            <a:ext cx="11830050" cy="8702676"/>
           </a:xfrm>
           <a:prstGeom prst="rect">
             <a:avLst/>
@@ -2869,18 +2531,13 @@
               <a:rPr lang="en-US"/>
               <a:t>Fifth level</a:t>
             </a:r>
-          </a:p>
-        </p:txBody>
-      </p:sp>
-      <p:sp>
-        <p:nvSpPr>
-          <p:cNvPr id="4" name="Date Placeholder 3">
-            <a:extLst>
-              <a:ext uri="{FF2B5EF4-FFF2-40B4-BE49-F238E27FC236}">
-                <a16:creationId xmlns:a16="http://schemas.microsoft.com/office/drawing/2014/main" id="{74B6FC42-2AEF-7A09-A00A-CFD6B199E606}"/>
-              </a:ext>
-            </a:extLst>
-          </p:cNvPr>
+            <a:endParaRPr lang="en-US" dirty="0"/>
+          </a:p>
+        </p:txBody>
+      </p:sp>
+      <p:sp>
+        <p:nvSpPr>
+          <p:cNvPr id="4" name="Date Placeholder 3"/>
           <p:cNvSpPr>
             <a:spLocks noGrp="1"/>
           </p:cNvSpPr>
@@ -2890,8 +2547,8 @@
         </p:nvSpPr>
         <p:spPr>
           <a:xfrm>
-            <a:off x="838200" y="6356350"/>
-            <a:ext cx="2743200" cy="365125"/>
+            <a:off x="942975" y="12712703"/>
+            <a:ext cx="3086100" cy="730250"/>
           </a:xfrm>
           <a:prstGeom prst="rect">
             <a:avLst/>
@@ -2901,7 +2558,7 @@
           <a:bodyPr vert="horz" lIns="91440" tIns="45720" rIns="91440" bIns="45720" rtlCol="0" anchor="ctr"/>
           <a:lstStyle>
             <a:lvl1pPr algn="l">
-              <a:defRPr sz="1200">
+              <a:defRPr sz="1800">
                 <a:solidFill>
                   <a:schemeClr val="tx1">
                     <a:tint val="75000"/>
@@ -2913,7 +2570,7 @@
           <a:p>
             <a:fld id="{68BE3505-B0F7-4A6F-AFA4-B6981E8353AB}" type="datetimeFigureOut">
               <a:rPr lang="en-US" smtClean="0"/>
-              <a:t>3/28/2023</a:t>
+              <a:t>3/30/2023</a:t>
             </a:fld>
             <a:endParaRPr lang="en-US"/>
           </a:p>
@@ -2921,13 +2578,7 @@
       </p:sp>
       <p:sp>
         <p:nvSpPr>
-          <p:cNvPr id="5" name="Footer Placeholder 4">
-            <a:extLst>
-              <a:ext uri="{FF2B5EF4-FFF2-40B4-BE49-F238E27FC236}">
-                <a16:creationId xmlns:a16="http://schemas.microsoft.com/office/drawing/2014/main" id="{77F2400F-C641-A36C-6A3C-FCECD814E83D}"/>
-              </a:ext>
-            </a:extLst>
-          </p:cNvPr>
+          <p:cNvPr id="5" name="Footer Placeholder 4"/>
           <p:cNvSpPr>
             <a:spLocks noGrp="1"/>
           </p:cNvSpPr>
@@ -2937,8 +2588,8 @@
         </p:nvSpPr>
         <p:spPr>
           <a:xfrm>
-            <a:off x="4038600" y="6356350"/>
-            <a:ext cx="4114800" cy="365125"/>
+            <a:off x="4543425" y="12712703"/>
+            <a:ext cx="4629150" cy="730250"/>
           </a:xfrm>
           <a:prstGeom prst="rect">
             <a:avLst/>
@@ -2948,7 +2599,7 @@
           <a:bodyPr vert="horz" lIns="91440" tIns="45720" rIns="91440" bIns="45720" rtlCol="0" anchor="ctr"/>
           <a:lstStyle>
             <a:lvl1pPr algn="ctr">
-              <a:defRPr sz="1200">
+              <a:defRPr sz="1800">
                 <a:solidFill>
                   <a:schemeClr val="tx1">
                     <a:tint val="75000"/>
@@ -2964,13 +2615,7 @@
       </p:sp>
       <p:sp>
         <p:nvSpPr>
-          <p:cNvPr id="6" name="Slide Number Placeholder 5">
-            <a:extLst>
-              <a:ext uri="{FF2B5EF4-FFF2-40B4-BE49-F238E27FC236}">
-                <a16:creationId xmlns:a16="http://schemas.microsoft.com/office/drawing/2014/main" id="{617928E5-A471-1A9F-F008-EE97649D4133}"/>
-              </a:ext>
-            </a:extLst>
-          </p:cNvPr>
+          <p:cNvPr id="6" name="Slide Number Placeholder 5"/>
           <p:cNvSpPr>
             <a:spLocks noGrp="1"/>
           </p:cNvSpPr>
@@ -2980,8 +2625,8 @@
         </p:nvSpPr>
         <p:spPr>
           <a:xfrm>
-            <a:off x="8610600" y="6356350"/>
-            <a:ext cx="2743200" cy="365125"/>
+            <a:off x="9686925" y="12712703"/>
+            <a:ext cx="3086100" cy="730250"/>
           </a:xfrm>
           <a:prstGeom prst="rect">
             <a:avLst/>
@@ -2991,7 +2636,7 @@
           <a:bodyPr vert="horz" lIns="91440" tIns="45720" rIns="91440" bIns="45720" rtlCol="0" anchor="ctr"/>
           <a:lstStyle>
             <a:lvl1pPr algn="r">
-              <a:defRPr sz="1200">
+              <a:defRPr sz="1800">
                 <a:solidFill>
                   <a:schemeClr val="tx1">
                     <a:tint val="75000"/>
@@ -3012,27 +2657,27 @@
     </p:spTree>
     <p:extLst>
       <p:ext uri="{BB962C8B-B14F-4D97-AF65-F5344CB8AC3E}">
-        <p14:creationId xmlns:p14="http://schemas.microsoft.com/office/powerpoint/2010/main" val="673799473"/>
+        <p14:creationId xmlns:p14="http://schemas.microsoft.com/office/powerpoint/2010/main" val="2244598970"/>
       </p:ext>
     </p:extLst>
   </p:cSld>
   <p:clrMap bg1="lt1" tx1="dk1" bg2="lt2" tx2="dk2" accent1="accent1" accent2="accent2" accent3="accent3" accent4="accent4" accent5="accent5" accent6="accent6" hlink="hlink" folHlink="folHlink"/>
   <p:sldLayoutIdLst>
-    <p:sldLayoutId id="2147483649" r:id="rId1"/>
-    <p:sldLayoutId id="2147483650" r:id="rId2"/>
-    <p:sldLayoutId id="2147483651" r:id="rId3"/>
-    <p:sldLayoutId id="2147483652" r:id="rId4"/>
-    <p:sldLayoutId id="2147483653" r:id="rId5"/>
-    <p:sldLayoutId id="2147483654" r:id="rId6"/>
-    <p:sldLayoutId id="2147483655" r:id="rId7"/>
-    <p:sldLayoutId id="2147483656" r:id="rId8"/>
-    <p:sldLayoutId id="2147483657" r:id="rId9"/>
-    <p:sldLayoutId id="2147483658" r:id="rId10"/>
-    <p:sldLayoutId id="2147483659" r:id="rId11"/>
+    <p:sldLayoutId id="2147483661" r:id="rId1"/>
+    <p:sldLayoutId id="2147483662" r:id="rId2"/>
+    <p:sldLayoutId id="2147483663" r:id="rId3"/>
+    <p:sldLayoutId id="2147483664" r:id="rId4"/>
+    <p:sldLayoutId id="2147483665" r:id="rId5"/>
+    <p:sldLayoutId id="2147483666" r:id="rId6"/>
+    <p:sldLayoutId id="2147483667" r:id="rId7"/>
+    <p:sldLayoutId id="2147483668" r:id="rId8"/>
+    <p:sldLayoutId id="2147483669" r:id="rId9"/>
+    <p:sldLayoutId id="2147483670" r:id="rId10"/>
+    <p:sldLayoutId id="2147483671" r:id="rId11"/>
   </p:sldLayoutIdLst>
   <p:txStyles>
     <p:titleStyle>
-      <a:lvl1pPr algn="l" defTabSz="914400" rtl="0" eaLnBrk="1" latinLnBrk="0" hangingPunct="1">
+      <a:lvl1pPr algn="l" defTabSz="1371600" rtl="0" eaLnBrk="1" latinLnBrk="0" hangingPunct="1">
         <a:lnSpc>
           <a:spcPct val="90000"/>
         </a:lnSpc>
@@ -3040,7 +2685,7 @@
           <a:spcPct val="0"/>
         </a:spcBef>
         <a:buNone/>
-        <a:defRPr sz="4400" kern="1200">
+        <a:defRPr sz="6600" kern="1200">
           <a:solidFill>
             <a:schemeClr val="tx1"/>
           </a:solidFill>
@@ -3051,16 +2696,16 @@
       </a:lvl1pPr>
     </p:titleStyle>
     <p:bodyStyle>
-      <a:lvl1pPr marL="228600" indent="-228600" algn="l" defTabSz="914400" rtl="0" eaLnBrk="1" latinLnBrk="0" hangingPunct="1">
+      <a:lvl1pPr marL="342900" indent="-342900" algn="l" defTabSz="1371600" rtl="0" eaLnBrk="1" latinLnBrk="0" hangingPunct="1">
         <a:lnSpc>
           <a:spcPct val="90000"/>
         </a:lnSpc>
         <a:spcBef>
-          <a:spcPts val="1000"/>
+          <a:spcPts val="1500"/>
         </a:spcBef>
         <a:buFont typeface="Arial" panose="020B0604020202020204" pitchFamily="34" charset="0"/>
         <a:buChar char="•"/>
-        <a:defRPr sz="2800" kern="1200">
+        <a:defRPr sz="4200" kern="1200">
           <a:solidFill>
             <a:schemeClr val="tx1"/>
           </a:solidFill>
@@ -3069,16 +2714,16 @@
           <a:cs typeface="+mn-cs"/>
         </a:defRPr>
       </a:lvl1pPr>
-      <a:lvl2pPr marL="685800" indent="-228600" algn="l" defTabSz="914400" rtl="0" eaLnBrk="1" latinLnBrk="0" hangingPunct="1">
+      <a:lvl2pPr marL="1028700" indent="-342900" algn="l" defTabSz="1371600" rtl="0" eaLnBrk="1" latinLnBrk="0" hangingPunct="1">
         <a:lnSpc>
           <a:spcPct val="90000"/>
         </a:lnSpc>
         <a:spcBef>
-          <a:spcPts val="500"/>
+          <a:spcPts val="750"/>
         </a:spcBef>
         <a:buFont typeface="Arial" panose="020B0604020202020204" pitchFamily="34" charset="0"/>
         <a:buChar char="•"/>
-        <a:defRPr sz="2400" kern="1200">
+        <a:defRPr sz="3600" kern="1200">
           <a:solidFill>
             <a:schemeClr val="tx1"/>
           </a:solidFill>
@@ -3087,16 +2732,16 @@
           <a:cs typeface="+mn-cs"/>
         </a:defRPr>
       </a:lvl2pPr>
-      <a:lvl3pPr marL="1143000" indent="-228600" algn="l" defTabSz="914400" rtl="0" eaLnBrk="1" latinLnBrk="0" hangingPunct="1">
+      <a:lvl3pPr marL="1714500" indent="-342900" algn="l" defTabSz="1371600" rtl="0" eaLnBrk="1" latinLnBrk="0" hangingPunct="1">
         <a:lnSpc>
           <a:spcPct val="90000"/>
         </a:lnSpc>
         <a:spcBef>
-          <a:spcPts val="500"/>
+          <a:spcPts val="750"/>
         </a:spcBef>
         <a:buFont typeface="Arial" panose="020B0604020202020204" pitchFamily="34" charset="0"/>
         <a:buChar char="•"/>
-        <a:defRPr sz="2000" kern="1200">
+        <a:defRPr sz="3000" kern="1200">
           <a:solidFill>
             <a:schemeClr val="tx1"/>
           </a:solidFill>
@@ -3105,16 +2750,16 @@
           <a:cs typeface="+mn-cs"/>
         </a:defRPr>
       </a:lvl3pPr>
-      <a:lvl4pPr marL="1600200" indent="-228600" algn="l" defTabSz="914400" rtl="0" eaLnBrk="1" latinLnBrk="0" hangingPunct="1">
+      <a:lvl4pPr marL="2400300" indent="-342900" algn="l" defTabSz="1371600" rtl="0" eaLnBrk="1" latinLnBrk="0" hangingPunct="1">
         <a:lnSpc>
           <a:spcPct val="90000"/>
         </a:lnSpc>
         <a:spcBef>
-          <a:spcPts val="500"/>
+          <a:spcPts val="750"/>
         </a:spcBef>
         <a:buFont typeface="Arial" panose="020B0604020202020204" pitchFamily="34" charset="0"/>
         <a:buChar char="•"/>
-        <a:defRPr sz="1800" kern="1200">
+        <a:defRPr sz="2700" kern="1200">
           <a:solidFill>
             <a:schemeClr val="tx1"/>
           </a:solidFill>
@@ -3123,16 +2768,16 @@
           <a:cs typeface="+mn-cs"/>
         </a:defRPr>
       </a:lvl4pPr>
-      <a:lvl5pPr marL="2057400" indent="-228600" algn="l" defTabSz="914400" rtl="0" eaLnBrk="1" latinLnBrk="0" hangingPunct="1">
+      <a:lvl5pPr marL="3086100" indent="-342900" algn="l" defTabSz="1371600" rtl="0" eaLnBrk="1" latinLnBrk="0" hangingPunct="1">
         <a:lnSpc>
           <a:spcPct val="90000"/>
         </a:lnSpc>
         <a:spcBef>
-          <a:spcPts val="500"/>
+          <a:spcPts val="750"/>
         </a:spcBef>
         <a:buFont typeface="Arial" panose="020B0604020202020204" pitchFamily="34" charset="0"/>
         <a:buChar char="•"/>
-        <a:defRPr sz="1800" kern="1200">
+        <a:defRPr sz="2700" kern="1200">
           <a:solidFill>
             <a:schemeClr val="tx1"/>
           </a:solidFill>
@@ -3141,16 +2786,16 @@
           <a:cs typeface="+mn-cs"/>
         </a:defRPr>
       </a:lvl5pPr>
-      <a:lvl6pPr marL="2514600" indent="-228600" algn="l" defTabSz="914400" rtl="0" eaLnBrk="1" latinLnBrk="0" hangingPunct="1">
+      <a:lvl6pPr marL="3771900" indent="-342900" algn="l" defTabSz="1371600" rtl="0" eaLnBrk="1" latinLnBrk="0" hangingPunct="1">
         <a:lnSpc>
           <a:spcPct val="90000"/>
         </a:lnSpc>
         <a:spcBef>
-          <a:spcPts val="500"/>
+          <a:spcPts val="750"/>
         </a:spcBef>
         <a:buFont typeface="Arial" panose="020B0604020202020204" pitchFamily="34" charset="0"/>
         <a:buChar char="•"/>
-        <a:defRPr sz="1800" kern="1200">
+        <a:defRPr sz="2700" kern="1200">
           <a:solidFill>
             <a:schemeClr val="tx1"/>
           </a:solidFill>
@@ -3159,16 +2804,16 @@
           <a:cs typeface="+mn-cs"/>
         </a:defRPr>
       </a:lvl6pPr>
-      <a:lvl7pPr marL="2971800" indent="-228600" algn="l" defTabSz="914400" rtl="0" eaLnBrk="1" latinLnBrk="0" hangingPunct="1">
+      <a:lvl7pPr marL="4457700" indent="-342900" algn="l" defTabSz="1371600" rtl="0" eaLnBrk="1" latinLnBrk="0" hangingPunct="1">
         <a:lnSpc>
           <a:spcPct val="90000"/>
         </a:lnSpc>
         <a:spcBef>
-          <a:spcPts val="500"/>
+          <a:spcPts val="750"/>
         </a:spcBef>
         <a:buFont typeface="Arial" panose="020B0604020202020204" pitchFamily="34" charset="0"/>
         <a:buChar char="•"/>
-        <a:defRPr sz="1800" kern="1200">
+        <a:defRPr sz="2700" kern="1200">
           <a:solidFill>
             <a:schemeClr val="tx1"/>
           </a:solidFill>
@@ -3177,16 +2822,16 @@
           <a:cs typeface="+mn-cs"/>
         </a:defRPr>
       </a:lvl7pPr>
-      <a:lvl8pPr marL="3429000" indent="-228600" algn="l" defTabSz="914400" rtl="0" eaLnBrk="1" latinLnBrk="0" hangingPunct="1">
+      <a:lvl8pPr marL="5143500" indent="-342900" algn="l" defTabSz="1371600" rtl="0" eaLnBrk="1" latinLnBrk="0" hangingPunct="1">
         <a:lnSpc>
           <a:spcPct val="90000"/>
         </a:lnSpc>
         <a:spcBef>
-          <a:spcPts val="500"/>
+          <a:spcPts val="750"/>
         </a:spcBef>
         <a:buFont typeface="Arial" panose="020B0604020202020204" pitchFamily="34" charset="0"/>
         <a:buChar char="•"/>
-        <a:defRPr sz="1800" kern="1200">
+        <a:defRPr sz="2700" kern="1200">
           <a:solidFill>
             <a:schemeClr val="tx1"/>
           </a:solidFill>
@@ -3195,16 +2840,16 @@
           <a:cs typeface="+mn-cs"/>
         </a:defRPr>
       </a:lvl8pPr>
-      <a:lvl9pPr marL="3886200" indent="-228600" algn="l" defTabSz="914400" rtl="0" eaLnBrk="1" latinLnBrk="0" hangingPunct="1">
+      <a:lvl9pPr marL="5829300" indent="-342900" algn="l" defTabSz="1371600" rtl="0" eaLnBrk="1" latinLnBrk="0" hangingPunct="1">
         <a:lnSpc>
           <a:spcPct val="90000"/>
         </a:lnSpc>
         <a:spcBef>
-          <a:spcPts val="500"/>
+          <a:spcPts val="750"/>
         </a:spcBef>
         <a:buFont typeface="Arial" panose="020B0604020202020204" pitchFamily="34" charset="0"/>
         <a:buChar char="•"/>
-        <a:defRPr sz="1800" kern="1200">
+        <a:defRPr sz="2700" kern="1200">
           <a:solidFill>
             <a:schemeClr val="tx1"/>
           </a:solidFill>
@@ -3218,8 +2863,8 @@
       <a:defPPr>
         <a:defRPr lang="en-US"/>
       </a:defPPr>
-      <a:lvl1pPr marL="0" algn="l" defTabSz="914400" rtl="0" eaLnBrk="1" latinLnBrk="0" hangingPunct="1">
-        <a:defRPr sz="1800" kern="1200">
+      <a:lvl1pPr marL="0" algn="l" defTabSz="1371600" rtl="0" eaLnBrk="1" latinLnBrk="0" hangingPunct="1">
+        <a:defRPr sz="2700" kern="1200">
           <a:solidFill>
             <a:schemeClr val="tx1"/>
           </a:solidFill>
@@ -3228,8 +2873,8 @@
           <a:cs typeface="+mn-cs"/>
         </a:defRPr>
       </a:lvl1pPr>
-      <a:lvl2pPr marL="457200" algn="l" defTabSz="914400" rtl="0" eaLnBrk="1" latinLnBrk="0" hangingPunct="1">
-        <a:defRPr sz="1800" kern="1200">
+      <a:lvl2pPr marL="685800" algn="l" defTabSz="1371600" rtl="0" eaLnBrk="1" latinLnBrk="0" hangingPunct="1">
+        <a:defRPr sz="2700" kern="1200">
           <a:solidFill>
             <a:schemeClr val="tx1"/>
           </a:solidFill>
@@ -3238,8 +2883,8 @@
           <a:cs typeface="+mn-cs"/>
         </a:defRPr>
       </a:lvl2pPr>
-      <a:lvl3pPr marL="914400" algn="l" defTabSz="914400" rtl="0" eaLnBrk="1" latinLnBrk="0" hangingPunct="1">
-        <a:defRPr sz="1800" kern="1200">
+      <a:lvl3pPr marL="1371600" algn="l" defTabSz="1371600" rtl="0" eaLnBrk="1" latinLnBrk="0" hangingPunct="1">
+        <a:defRPr sz="2700" kern="1200">
           <a:solidFill>
             <a:schemeClr val="tx1"/>
           </a:solidFill>
@@ -3248,8 +2893,8 @@
           <a:cs typeface="+mn-cs"/>
         </a:defRPr>
       </a:lvl3pPr>
-      <a:lvl4pPr marL="1371600" algn="l" defTabSz="914400" rtl="0" eaLnBrk="1" latinLnBrk="0" hangingPunct="1">
-        <a:defRPr sz="1800" kern="1200">
+      <a:lvl4pPr marL="2057400" algn="l" defTabSz="1371600" rtl="0" eaLnBrk="1" latinLnBrk="0" hangingPunct="1">
+        <a:defRPr sz="2700" kern="1200">
           <a:solidFill>
             <a:schemeClr val="tx1"/>
           </a:solidFill>
@@ -3258,8 +2903,8 @@
           <a:cs typeface="+mn-cs"/>
         </a:defRPr>
       </a:lvl4pPr>
-      <a:lvl5pPr marL="1828800" algn="l" defTabSz="914400" rtl="0" eaLnBrk="1" latinLnBrk="0" hangingPunct="1">
-        <a:defRPr sz="1800" kern="1200">
+      <a:lvl5pPr marL="2743200" algn="l" defTabSz="1371600" rtl="0" eaLnBrk="1" latinLnBrk="0" hangingPunct="1">
+        <a:defRPr sz="2700" kern="1200">
           <a:solidFill>
             <a:schemeClr val="tx1"/>
           </a:solidFill>
@@ -3268,8 +2913,8 @@
           <a:cs typeface="+mn-cs"/>
         </a:defRPr>
       </a:lvl5pPr>
-      <a:lvl6pPr marL="2286000" algn="l" defTabSz="914400" rtl="0" eaLnBrk="1" latinLnBrk="0" hangingPunct="1">
-        <a:defRPr sz="1800" kern="1200">
+      <a:lvl6pPr marL="3429000" algn="l" defTabSz="1371600" rtl="0" eaLnBrk="1" latinLnBrk="0" hangingPunct="1">
+        <a:defRPr sz="2700" kern="1200">
           <a:solidFill>
             <a:schemeClr val="tx1"/>
           </a:solidFill>
@@ -3278,8 +2923,8 @@
           <a:cs typeface="+mn-cs"/>
         </a:defRPr>
       </a:lvl6pPr>
-      <a:lvl7pPr marL="2743200" algn="l" defTabSz="914400" rtl="0" eaLnBrk="1" latinLnBrk="0" hangingPunct="1">
-        <a:defRPr sz="1800" kern="1200">
+      <a:lvl7pPr marL="4114800" algn="l" defTabSz="1371600" rtl="0" eaLnBrk="1" latinLnBrk="0" hangingPunct="1">
+        <a:defRPr sz="2700" kern="1200">
           <a:solidFill>
             <a:schemeClr val="tx1"/>
           </a:solidFill>
@@ -3288,8 +2933,8 @@
           <a:cs typeface="+mn-cs"/>
         </a:defRPr>
       </a:lvl7pPr>
-      <a:lvl8pPr marL="3200400" algn="l" defTabSz="914400" rtl="0" eaLnBrk="1" latinLnBrk="0" hangingPunct="1">
-        <a:defRPr sz="1800" kern="1200">
+      <a:lvl8pPr marL="4800600" algn="l" defTabSz="1371600" rtl="0" eaLnBrk="1" latinLnBrk="0" hangingPunct="1">
+        <a:defRPr sz="2700" kern="1200">
           <a:solidFill>
             <a:schemeClr val="tx1"/>
           </a:solidFill>
@@ -3298,8 +2943,8 @@
           <a:cs typeface="+mn-cs"/>
         </a:defRPr>
       </a:lvl8pPr>
-      <a:lvl9pPr marL="3657600" algn="l" defTabSz="914400" rtl="0" eaLnBrk="1" latinLnBrk="0" hangingPunct="1">
-        <a:defRPr sz="1800" kern="1200">
+      <a:lvl9pPr marL="5486400" algn="l" defTabSz="1371600" rtl="0" eaLnBrk="1" latinLnBrk="0" hangingPunct="1">
+        <a:defRPr sz="2700" kern="1200">
           <a:solidFill>
             <a:schemeClr val="tx1"/>
           </a:solidFill>
@@ -3363,7 +3008,7 @@
         </p:blipFill>
         <p:spPr>
           <a:xfrm>
-            <a:off x="2395213" y="883612"/>
+            <a:off x="3157213" y="4312612"/>
             <a:ext cx="7150004" cy="4627256"/>
           </a:xfrm>
           <a:prstGeom prst="rect">
@@ -3387,7 +3032,7 @@
         </p:nvCxnSpPr>
         <p:spPr>
           <a:xfrm flipH="1">
-            <a:off x="2397657" y="5491951"/>
+            <a:off x="3159657" y="8920951"/>
             <a:ext cx="7147560" cy="0"/>
           </a:xfrm>
           <a:prstGeom prst="line">
@@ -3424,7 +3069,7 @@
         </p:nvSpPr>
         <p:spPr>
           <a:xfrm>
-            <a:off x="2374797" y="5490803"/>
+            <a:off x="3136797" y="8919804"/>
             <a:ext cx="230132" cy="307777"/>
           </a:xfrm>
           <a:prstGeom prst="rect">
@@ -3462,7 +3107,7 @@
         </p:nvSpPr>
         <p:spPr>
           <a:xfrm>
-            <a:off x="4279253" y="5495067"/>
+            <a:off x="5041253" y="8924068"/>
             <a:ext cx="609216" cy="307777"/>
           </a:xfrm>
           <a:prstGeom prst="rect">
@@ -3500,7 +3145,7 @@
         </p:nvSpPr>
         <p:spPr>
           <a:xfrm>
-            <a:off x="6203636" y="5489060"/>
+            <a:off x="6965637" y="8918061"/>
             <a:ext cx="813295" cy="307777"/>
           </a:xfrm>
           <a:prstGeom prst="rect">
@@ -3538,7 +3183,7 @@
         </p:nvSpPr>
         <p:spPr>
           <a:xfrm>
-            <a:off x="8205064" y="5491951"/>
+            <a:off x="8967064" y="8920952"/>
             <a:ext cx="950924" cy="307777"/>
           </a:xfrm>
           <a:prstGeom prst="rect">
@@ -3576,7 +3221,7 @@
         </p:nvCxnSpPr>
         <p:spPr>
           <a:xfrm flipV="1">
-            <a:off x="2397657" y="886503"/>
+            <a:off x="3159657" y="4315504"/>
             <a:ext cx="0" cy="4602557"/>
           </a:xfrm>
           <a:prstGeom prst="line">
@@ -3613,7 +3258,7 @@
         </p:nvSpPr>
         <p:spPr>
           <a:xfrm>
-            <a:off x="2144982" y="5126820"/>
+            <a:off x="2906982" y="8555821"/>
             <a:ext cx="230132" cy="307777"/>
           </a:xfrm>
           <a:prstGeom prst="rect">
@@ -3651,7 +3296,7 @@
         </p:nvSpPr>
         <p:spPr>
           <a:xfrm>
-            <a:off x="2144982" y="4002185"/>
+            <a:off x="2906982" y="7431186"/>
             <a:ext cx="230132" cy="307777"/>
           </a:xfrm>
           <a:prstGeom prst="rect">
@@ -3689,7 +3334,7 @@
         </p:nvSpPr>
         <p:spPr>
           <a:xfrm>
-            <a:off x="2036818" y="2889683"/>
+            <a:off x="2798818" y="6318684"/>
             <a:ext cx="423824" cy="307777"/>
           </a:xfrm>
           <a:prstGeom prst="rect">
@@ -3727,7 +3372,7 @@
         </p:nvSpPr>
         <p:spPr>
           <a:xfrm>
-            <a:off x="2036818" y="1744179"/>
+            <a:off x="2798818" y="5173180"/>
             <a:ext cx="423824" cy="307777"/>
           </a:xfrm>
           <a:prstGeom prst="rect">
@@ -3765,8 +3410,8 @@
         </p:nvSpPr>
         <p:spPr>
           <a:xfrm rot="16200000">
-            <a:off x="1172394" y="3065704"/>
-            <a:ext cx="1314305" cy="263071"/>
+            <a:off x="1934395" y="6181183"/>
+            <a:ext cx="1314305" cy="890115"/>
           </a:xfrm>
           <a:prstGeom prst="rect">
             <a:avLst/>
@@ -3805,8 +3450,8 @@
             </p:nvSpPr>
             <p:spPr>
               <a:xfrm>
-                <a:off x="5295332" y="5739372"/>
-                <a:ext cx="1426853" cy="369332"/>
+                <a:off x="6057333" y="9168373"/>
+                <a:ext cx="1426853" cy="491225"/>
               </a:xfrm>
               <a:prstGeom prst="rect">
                 <a:avLst/>
@@ -3829,7 +3474,7 @@
                       <m:sSub>
                         <m:sSubPr>
                           <m:ctrlPr>
-                            <a:rPr lang="en-US" i="1" smtClean="0">
+                            <a:rPr lang="en-US" i="1">
                               <a:latin typeface="Cambria Math" panose="02040503050406030204" pitchFamily="18" charset="0"/>
                             </a:rPr>
                           </m:ctrlPr>
@@ -3839,7 +3484,7 @@
                             <m:rPr>
                               <m:sty m:val="p"/>
                             </m:rPr>
-                            <a:rPr lang="en-US" b="0" i="0" smtClean="0">
+                            <a:rPr lang="en-US">
                               <a:latin typeface="Cambria Math" panose="02040503050406030204" pitchFamily="18" charset="0"/>
                             </a:rPr>
                             <m:t>C</m:t>
@@ -3850,7 +3495,7 @@
                             <m:rPr>
                               <m:sty m:val="p"/>
                             </m:rPr>
-                            <a:rPr lang="en-US" b="0" i="0" smtClean="0">
+                            <a:rPr lang="en-US">
                               <a:latin typeface="Cambria Math" panose="02040503050406030204" pitchFamily="18" charset="0"/>
                             </a:rPr>
                             <m:t>i</m:t>
@@ -3882,8 +3527,8 @@
             </p:nvSpPr>
             <p:spPr>
               <a:xfrm>
-                <a:off x="5295332" y="5739372"/>
-                <a:ext cx="1426853" cy="369332"/>
+                <a:off x="6057333" y="9168373"/>
+                <a:ext cx="1426853" cy="491225"/>
               </a:xfrm>
               <a:prstGeom prst="rect">
                 <a:avLst/>
@@ -3924,7 +3569,7 @@
         </p:nvGrpSpPr>
         <p:grpSpPr>
           <a:xfrm>
-            <a:off x="8444637" y="4049602"/>
+            <a:off x="9206637" y="7478602"/>
             <a:ext cx="1255780" cy="1077218"/>
             <a:chOff x="9893102" y="4195019"/>
             <a:chExt cx="1763019" cy="1077218"/>
@@ -4226,8 +3871,8 @@
         </p:nvSpPr>
         <p:spPr>
           <a:xfrm>
-            <a:off x="361950" y="762000"/>
-            <a:ext cx="1336060" cy="369332"/>
+            <a:off x="1123950" y="4191001"/>
+            <a:ext cx="1336060" cy="491225"/>
           </a:xfrm>
           <a:prstGeom prst="rect">
             <a:avLst/>
@@ -4291,10 +3936,10 @@
         </p:nvGrpSpPr>
         <p:grpSpPr>
           <a:xfrm>
-            <a:off x="1698011" y="817880"/>
-            <a:ext cx="8002406" cy="5290824"/>
-            <a:chOff x="1698011" y="817880"/>
-            <a:chExt cx="8002406" cy="5290824"/>
+            <a:off x="2146489" y="4246881"/>
+            <a:ext cx="8315928" cy="5412717"/>
+            <a:chOff x="1384489" y="817880"/>
+            <a:chExt cx="8315928" cy="5412717"/>
           </a:xfrm>
         </p:grpSpPr>
         <p:pic>
@@ -4352,10 +3997,10 @@
           </p:nvGrpSpPr>
           <p:grpSpPr>
             <a:xfrm>
-              <a:off x="1698011" y="817880"/>
-              <a:ext cx="8002406" cy="5290824"/>
-              <a:chOff x="1698011" y="817880"/>
-              <a:chExt cx="8002406" cy="5290824"/>
+              <a:off x="1384489" y="817880"/>
+              <a:ext cx="8315928" cy="5412717"/>
+              <a:chOff x="1384489" y="817880"/>
+              <a:chExt cx="8315928" cy="5412717"/>
             </a:xfrm>
           </p:grpSpPr>
           <p:cxnSp>
@@ -4752,8 +4397,8 @@
             </p:nvSpPr>
             <p:spPr>
               <a:xfrm rot="16200000">
-                <a:off x="1172394" y="3065704"/>
-                <a:ext cx="1314305" cy="263071"/>
+                <a:off x="1172394" y="2752182"/>
+                <a:ext cx="1314305" cy="890115"/>
               </a:xfrm>
               <a:prstGeom prst="rect">
                 <a:avLst/>
@@ -4776,8 +4421,8 @@
               </a:p>
             </p:txBody>
           </p:sp>
-          <mc:AlternateContent xmlns:mc="http://schemas.openxmlformats.org/markup-compatibility/2006" xmlns:a14="http://schemas.microsoft.com/office/drawing/2010/main">
-            <mc:Choice Requires="a14">
+          <mc:AlternateContent xmlns:mc="http://schemas.openxmlformats.org/markup-compatibility/2006">
+            <mc:Choice xmlns:a14="http://schemas.microsoft.com/office/drawing/2010/main" Requires="a14">
               <p:sp>
                 <p:nvSpPr>
                   <p:cNvPr id="19" name="TextBox 18">
@@ -4793,7 +4438,7 @@
                 <p:spPr>
                   <a:xfrm>
                     <a:off x="5295332" y="5739372"/>
-                    <a:ext cx="1426853" cy="369332"/>
+                    <a:ext cx="1426853" cy="491225"/>
                   </a:xfrm>
                   <a:prstGeom prst="rect">
                     <a:avLst/>
@@ -4816,7 +4461,7 @@
                           <m:sSub>
                             <m:sSubPr>
                               <m:ctrlPr>
-                                <a:rPr lang="en-US" i="1" smtClean="0">
+                                <a:rPr lang="en-US" i="1">
                                   <a:latin typeface="Cambria Math" panose="02040503050406030204" pitchFamily="18" charset="0"/>
                                 </a:rPr>
                               </m:ctrlPr>
@@ -4826,7 +4471,7 @@
                                 <m:rPr>
                                   <m:sty m:val="p"/>
                                 </m:rPr>
-                                <a:rPr lang="en-US" b="0" i="0" smtClean="0">
+                                <a:rPr lang="en-US">
                                   <a:latin typeface="Cambria Math" panose="02040503050406030204" pitchFamily="18" charset="0"/>
                                 </a:rPr>
                                 <m:t>C</m:t>
@@ -4837,7 +4482,7 @@
                                 <m:rPr>
                                   <m:sty m:val="p"/>
                                 </m:rPr>
-                                <a:rPr lang="en-US" b="0" i="0" smtClean="0">
+                                <a:rPr lang="en-US">
                                   <a:latin typeface="Cambria Math" panose="02040503050406030204" pitchFamily="18" charset="0"/>
                                 </a:rPr>
                                 <m:t>i</m:t>
@@ -4852,7 +4497,7 @@
                 </p:txBody>
               </p:sp>
             </mc:Choice>
-            <mc:Fallback xmlns="">
+            <mc:Fallback>
               <p:sp>
                 <p:nvSpPr>
                   <p:cNvPr id="19" name="TextBox 18">
@@ -4870,7 +4515,7 @@
                 <p:spPr>
                   <a:xfrm>
                     <a:off x="5295332" y="5739372"/>
-                    <a:ext cx="1426853" cy="369332"/>
+                    <a:ext cx="1426853" cy="491225"/>
                   </a:xfrm>
                   <a:prstGeom prst="rect">
                     <a:avLst/>
@@ -5215,8 +4860,8 @@
         </p:nvSpPr>
         <p:spPr>
           <a:xfrm>
-            <a:off x="361950" y="762000"/>
-            <a:ext cx="1336060" cy="369332"/>
+            <a:off x="1123950" y="4191001"/>
+            <a:ext cx="1336060" cy="491225"/>
           </a:xfrm>
           <a:prstGeom prst="rect">
             <a:avLst/>
@@ -5280,10 +4925,10 @@
         </p:nvGrpSpPr>
         <p:grpSpPr>
           <a:xfrm>
-            <a:off x="1698011" y="1342934"/>
-            <a:ext cx="7502943" cy="4819034"/>
-            <a:chOff x="1698011" y="1342934"/>
-            <a:chExt cx="7502943" cy="4819034"/>
+            <a:off x="2146490" y="4771935"/>
+            <a:ext cx="7816465" cy="4940927"/>
+            <a:chOff x="1384489" y="1342934"/>
+            <a:chExt cx="7816465" cy="4940927"/>
           </a:xfrm>
         </p:grpSpPr>
         <p:pic>
@@ -5711,8 +5356,8 @@
           </p:nvSpPr>
           <p:spPr>
             <a:xfrm rot="16200000">
-              <a:off x="1172394" y="3065704"/>
-              <a:ext cx="1314305" cy="263071"/>
+              <a:off x="1172394" y="2752182"/>
+              <a:ext cx="1314305" cy="890115"/>
             </a:xfrm>
             <a:prstGeom prst="rect">
               <a:avLst/>
@@ -5752,7 +5397,7 @@
               <p:spPr>
                 <a:xfrm>
                   <a:off x="4968797" y="5792636"/>
-                  <a:ext cx="1426853" cy="369332"/>
+                  <a:ext cx="1426853" cy="491225"/>
                 </a:xfrm>
                 <a:prstGeom prst="rect">
                   <a:avLst/>
@@ -5775,7 +5420,7 @@
                         <m:sSub>
                           <m:sSubPr>
                             <m:ctrlPr>
-                              <a:rPr lang="en-US" i="1" smtClean="0">
+                              <a:rPr lang="en-US" i="1">
                                 <a:latin typeface="Cambria Math" panose="02040503050406030204" pitchFamily="18" charset="0"/>
                               </a:rPr>
                             </m:ctrlPr>
@@ -5785,7 +5430,7 @@
                               <m:rPr>
                                 <m:sty m:val="p"/>
                               </m:rPr>
-                              <a:rPr lang="en-US" b="0" i="0" smtClean="0">
+                              <a:rPr lang="en-US">
                                 <a:latin typeface="Cambria Math" panose="02040503050406030204" pitchFamily="18" charset="0"/>
                               </a:rPr>
                               <m:t>C</m:t>
@@ -5796,7 +5441,7 @@
                               <m:rPr>
                                 <m:sty m:val="p"/>
                               </m:rPr>
-                              <a:rPr lang="en-US" b="0" i="0" smtClean="0">
+                              <a:rPr lang="en-US">
                                 <a:latin typeface="Cambria Math" panose="02040503050406030204" pitchFamily="18" charset="0"/>
                               </a:rPr>
                               <m:t>i</m:t>
@@ -5829,7 +5474,7 @@
               <p:spPr>
                 <a:xfrm>
                   <a:off x="4968797" y="5792636"/>
-                  <a:ext cx="1426853" cy="369332"/>
+                  <a:ext cx="1426853" cy="491225"/>
                 </a:xfrm>
                 <a:prstGeom prst="rect">
                   <a:avLst/>
@@ -6211,8 +5856,8 @@
         </p:nvSpPr>
         <p:spPr>
           <a:xfrm>
-            <a:off x="361950" y="762000"/>
-            <a:ext cx="1336060" cy="369332"/>
+            <a:off x="1123950" y="4191001"/>
+            <a:ext cx="1336060" cy="491225"/>
           </a:xfrm>
           <a:prstGeom prst="rect">
             <a:avLst/>
@@ -6278,8 +5923,8 @@
             </p:nvSpPr>
             <p:spPr>
               <a:xfrm>
-                <a:off x="4968797" y="5792636"/>
-                <a:ext cx="1426853" cy="369332"/>
+                <a:off x="5730798" y="9221637"/>
+                <a:ext cx="1426853" cy="491225"/>
               </a:xfrm>
               <a:prstGeom prst="rect">
                 <a:avLst/>
@@ -6302,7 +5947,7 @@
                       <m:sSub>
                         <m:sSubPr>
                           <m:ctrlPr>
-                            <a:rPr lang="en-US" i="1" smtClean="0">
+                            <a:rPr lang="en-US" i="1">
                               <a:latin typeface="Cambria Math" panose="02040503050406030204" pitchFamily="18" charset="0"/>
                             </a:rPr>
                           </m:ctrlPr>
@@ -6312,7 +5957,7 @@
                             <m:rPr>
                               <m:sty m:val="p"/>
                             </m:rPr>
-                            <a:rPr lang="en-US" b="0" i="0" smtClean="0">
+                            <a:rPr lang="en-US">
                               <a:latin typeface="Cambria Math" panose="02040503050406030204" pitchFamily="18" charset="0"/>
                             </a:rPr>
                             <m:t>C</m:t>
@@ -6323,7 +5968,7 @@
                             <m:rPr>
                               <m:sty m:val="p"/>
                             </m:rPr>
-                            <a:rPr lang="en-US" b="0" i="0" smtClean="0">
+                            <a:rPr lang="en-US">
                               <a:latin typeface="Cambria Math" panose="02040503050406030204" pitchFamily="18" charset="0"/>
                             </a:rPr>
                             <m:t>i</m:t>
@@ -6355,8 +6000,8 @@
             </p:nvSpPr>
             <p:spPr>
               <a:xfrm>
-                <a:off x="4968797" y="5792636"/>
-                <a:ext cx="1426853" cy="369332"/>
+                <a:off x="5730798" y="9221637"/>
+                <a:ext cx="1426853" cy="491225"/>
               </a:xfrm>
               <a:prstGeom prst="rect">
                 <a:avLst/>
@@ -6397,10 +6042,10 @@
         </p:nvGrpSpPr>
         <p:grpSpPr>
           <a:xfrm>
-            <a:off x="1698011" y="1342934"/>
-            <a:ext cx="7502943" cy="4459910"/>
-            <a:chOff x="1698011" y="1342934"/>
-            <a:chExt cx="7502943" cy="4459910"/>
+            <a:off x="2146490" y="4771934"/>
+            <a:ext cx="7816465" cy="4459910"/>
+            <a:chOff x="1384489" y="1342934"/>
+            <a:chExt cx="7816465" cy="4459910"/>
           </a:xfrm>
         </p:grpSpPr>
         <p:pic>
@@ -6828,8 +6473,8 @@
           </p:nvSpPr>
           <p:spPr>
             <a:xfrm rot="16200000">
-              <a:off x="1172394" y="3065704"/>
-              <a:ext cx="1314305" cy="263071"/>
+              <a:off x="1172394" y="2752182"/>
+              <a:ext cx="1314305" cy="890115"/>
             </a:xfrm>
             <a:prstGeom prst="rect">
               <a:avLst/>
@@ -7215,7 +6860,7 @@
         </p:blipFill>
         <p:spPr>
           <a:xfrm>
-            <a:off x="274278" y="849115"/>
+            <a:off x="1036278" y="4278116"/>
             <a:ext cx="1390008" cy="493819"/>
           </a:xfrm>
           <a:prstGeom prst="rect">
@@ -7253,6 +6898,698 @@
           <a:chExt cx="0" cy="0"/>
         </a:xfrm>
       </p:grpSpPr>
+      <p:pic>
+        <p:nvPicPr>
+          <p:cNvPr id="2" name="Picture 1">
+            <a:extLst>
+              <a:ext uri="{FF2B5EF4-FFF2-40B4-BE49-F238E27FC236}">
+                <a16:creationId xmlns:a16="http://schemas.microsoft.com/office/drawing/2014/main" id="{9EF5A623-F153-49E1-CB8E-652FAB4BCF55}"/>
+              </a:ext>
+            </a:extLst>
+          </p:cNvPr>
+          <p:cNvPicPr>
+            <a:picLocks noChangeAspect="1"/>
+          </p:cNvPicPr>
+          <p:nvPr/>
+        </p:nvPicPr>
+        <p:blipFill rotWithShape="1">
+          <a:blip r:embed="rId2">
+            <a:extLst>
+              <a:ext uri="{BEBA8EAE-BF5A-486C-A8C5-ECC9F3942E4B}">
+                <a14:imgProps xmlns:a14="http://schemas.microsoft.com/office/drawing/2010/main">
+                  <a14:imgLayer r:embed="rId3">
+                    <a14:imgEffect>
+                      <a14:sharpenSoften amount="25000"/>
+                    </a14:imgEffect>
+                  </a14:imgLayer>
+                </a14:imgProps>
+              </a:ext>
+            </a:extLst>
+          </a:blip>
+          <a:srcRect l="3755" t="1442" r="14623" b="3844"/>
+          <a:stretch/>
+        </p:blipFill>
+        <p:spPr>
+          <a:xfrm>
+            <a:off x="1586995" y="1365019"/>
+            <a:ext cx="4948416" cy="5757674"/>
+          </a:xfrm>
+          <a:prstGeom prst="rect">
+            <a:avLst/>
+          </a:prstGeom>
+        </p:spPr>
+      </p:pic>
+      <p:pic>
+        <p:nvPicPr>
+          <p:cNvPr id="3" name="Picture 2">
+            <a:extLst>
+              <a:ext uri="{FF2B5EF4-FFF2-40B4-BE49-F238E27FC236}">
+                <a16:creationId xmlns:a16="http://schemas.microsoft.com/office/drawing/2014/main" id="{A6BD0630-BCAD-C5A7-113D-409FAC5D0516}"/>
+              </a:ext>
+            </a:extLst>
+          </p:cNvPr>
+          <p:cNvPicPr>
+            <a:picLocks noChangeAspect="1"/>
+          </p:cNvPicPr>
+          <p:nvPr/>
+        </p:nvPicPr>
+        <p:blipFill rotWithShape="1">
+          <a:blip r:embed="rId4">
+            <a:extLst>
+              <a:ext uri="{BEBA8EAE-BF5A-486C-A8C5-ECC9F3942E4B}">
+                <a14:imgProps xmlns:a14="http://schemas.microsoft.com/office/drawing/2010/main">
+                  <a14:imgLayer r:embed="rId5">
+                    <a14:imgEffect>
+                      <a14:sharpenSoften amount="25000"/>
+                    </a14:imgEffect>
+                  </a14:imgLayer>
+                </a14:imgProps>
+              </a:ext>
+            </a:extLst>
+          </a:blip>
+          <a:srcRect l="3304" t="1969" r="14096" b="3991"/>
+          <a:stretch/>
+        </p:blipFill>
+        <p:spPr>
+          <a:xfrm>
+            <a:off x="6761543" y="1380718"/>
+            <a:ext cx="4948416" cy="5740163"/>
+          </a:xfrm>
+          <a:prstGeom prst="rect">
+            <a:avLst/>
+          </a:prstGeom>
+        </p:spPr>
+      </p:pic>
+      <p:pic>
+        <p:nvPicPr>
+          <p:cNvPr id="4" name="Picture 3">
+            <a:extLst>
+              <a:ext uri="{FF2B5EF4-FFF2-40B4-BE49-F238E27FC236}">
+                <a16:creationId xmlns:a16="http://schemas.microsoft.com/office/drawing/2014/main" id="{5EEA600F-E8B5-6EA4-1AD8-27433EDE7F46}"/>
+              </a:ext>
+            </a:extLst>
+          </p:cNvPr>
+          <p:cNvPicPr>
+            <a:picLocks noChangeAspect="1"/>
+          </p:cNvPicPr>
+          <p:nvPr/>
+        </p:nvPicPr>
+        <p:blipFill rotWithShape="1">
+          <a:blip r:embed="rId6">
+            <a:extLst>
+              <a:ext uri="{BEBA8EAE-BF5A-486C-A8C5-ECC9F3942E4B}">
+                <a14:imgProps xmlns:a14="http://schemas.microsoft.com/office/drawing/2010/main">
+                  <a14:imgLayer r:embed="rId7">
+                    <a14:imgEffect>
+                      <a14:sharpenSoften amount="25000"/>
+                    </a14:imgEffect>
+                  </a14:imgLayer>
+                </a14:imgProps>
+              </a:ext>
+            </a:extLst>
+          </a:blip>
+          <a:srcRect l="3538" t="2122" r="12940" b="1379"/>
+          <a:stretch/>
+        </p:blipFill>
+        <p:spPr>
+          <a:xfrm>
+            <a:off x="1586995" y="7421288"/>
+            <a:ext cx="4970150" cy="5757674"/>
+          </a:xfrm>
+          <a:prstGeom prst="rect">
+            <a:avLst/>
+          </a:prstGeom>
+        </p:spPr>
+      </p:pic>
+      <p:pic>
+        <p:nvPicPr>
+          <p:cNvPr id="5" name="Picture 4">
+            <a:extLst>
+              <a:ext uri="{FF2B5EF4-FFF2-40B4-BE49-F238E27FC236}">
+                <a16:creationId xmlns:a16="http://schemas.microsoft.com/office/drawing/2014/main" id="{D8ECBEE6-2138-7063-74A3-DFCB47AB5A53}"/>
+              </a:ext>
+            </a:extLst>
+          </p:cNvPr>
+          <p:cNvPicPr>
+            <a:picLocks noChangeAspect="1"/>
+          </p:cNvPicPr>
+          <p:nvPr/>
+        </p:nvPicPr>
+        <p:blipFill rotWithShape="1">
+          <a:blip r:embed="rId8">
+            <a:extLst>
+              <a:ext uri="{BEBA8EAE-BF5A-486C-A8C5-ECC9F3942E4B}">
+                <a14:imgProps xmlns:a14="http://schemas.microsoft.com/office/drawing/2010/main">
+                  <a14:imgLayer r:embed="rId9">
+                    <a14:imgEffect>
+                      <a14:sharpenSoften amount="25000"/>
+                    </a14:imgEffect>
+                  </a14:imgLayer>
+                </a14:imgProps>
+              </a:ext>
+            </a:extLst>
+          </a:blip>
+          <a:srcRect l="1137" t="1469" b="1"/>
+          <a:stretch/>
+        </p:blipFill>
+        <p:spPr>
+          <a:xfrm>
+            <a:off x="6894164" y="7421287"/>
+            <a:ext cx="4948416" cy="5757673"/>
+          </a:xfrm>
+          <a:prstGeom prst="rect">
+            <a:avLst/>
+          </a:prstGeom>
+        </p:spPr>
+      </p:pic>
+      <p:sp>
+        <p:nvSpPr>
+          <p:cNvPr id="6" name="TextBox 5">
+            <a:extLst>
+              <a:ext uri="{FF2B5EF4-FFF2-40B4-BE49-F238E27FC236}">
+                <a16:creationId xmlns:a16="http://schemas.microsoft.com/office/drawing/2014/main" id="{D06766BA-C48D-80FF-CFDB-9D1207CDD07F}"/>
+              </a:ext>
+            </a:extLst>
+          </p:cNvPr>
+          <p:cNvSpPr txBox="1"/>
+          <p:nvPr/>
+        </p:nvSpPr>
+        <p:spPr>
+          <a:xfrm rot="16200000">
+            <a:off x="-876847" y="3982244"/>
+            <a:ext cx="2819184" cy="523220"/>
+          </a:xfrm>
+          <a:prstGeom prst="rect">
+            <a:avLst/>
+          </a:prstGeom>
+          <a:noFill/>
+        </p:spPr>
+        <p:txBody>
+          <a:bodyPr wrap="square" rtlCol="0">
+            <a:spAutoFit/>
+          </a:bodyPr>
+          <a:lstStyle/>
+          <a:p>
+            <a:pPr algn="ctr"/>
+            <a:r>
+              <a:rPr lang="en-US" sz="2800" b="1" dirty="0"/>
+              <a:t>Steady-State</a:t>
+            </a:r>
+          </a:p>
+        </p:txBody>
+      </p:sp>
+      <p:sp>
+        <p:nvSpPr>
+          <p:cNvPr id="7" name="TextBox 6">
+            <a:extLst>
+              <a:ext uri="{FF2B5EF4-FFF2-40B4-BE49-F238E27FC236}">
+                <a16:creationId xmlns:a16="http://schemas.microsoft.com/office/drawing/2014/main" id="{3672FBF3-191A-A016-E898-3F0AA989139F}"/>
+              </a:ext>
+            </a:extLst>
+          </p:cNvPr>
+          <p:cNvSpPr txBox="1"/>
+          <p:nvPr/>
+        </p:nvSpPr>
+        <p:spPr>
+          <a:xfrm rot="16200000">
+            <a:off x="-16876" y="9739921"/>
+            <a:ext cx="1099243" cy="523220"/>
+          </a:xfrm>
+          <a:prstGeom prst="rect">
+            <a:avLst/>
+          </a:prstGeom>
+          <a:noFill/>
+        </p:spPr>
+        <p:txBody>
+          <a:bodyPr wrap="square" rtlCol="0">
+            <a:spAutoFit/>
+          </a:bodyPr>
+          <a:lstStyle/>
+          <a:p>
+            <a:pPr algn="ctr"/>
+            <a:r>
+              <a:rPr lang="en-US" sz="2800" b="1" dirty="0"/>
+              <a:t>DAT</a:t>
+            </a:r>
+          </a:p>
+        </p:txBody>
+      </p:sp>
+      <p:sp>
+        <p:nvSpPr>
+          <p:cNvPr id="9" name="TextBox 8">
+            <a:extLst>
+              <a:ext uri="{FF2B5EF4-FFF2-40B4-BE49-F238E27FC236}">
+                <a16:creationId xmlns:a16="http://schemas.microsoft.com/office/drawing/2014/main" id="{54599E94-E362-62D3-B9E3-987D772CB854}"/>
+              </a:ext>
+            </a:extLst>
+          </p:cNvPr>
+          <p:cNvSpPr txBox="1"/>
+          <p:nvPr/>
+        </p:nvSpPr>
+        <p:spPr>
+          <a:xfrm rot="16200000">
+            <a:off x="787823" y="3798797"/>
+            <a:ext cx="1314305" cy="890115"/>
+          </a:xfrm>
+          <a:prstGeom prst="rect">
+            <a:avLst/>
+          </a:prstGeom>
+          <a:noFill/>
+        </p:spPr>
+        <p:txBody>
+          <a:bodyPr wrap="square" rtlCol="0">
+            <a:spAutoFit/>
+          </a:bodyPr>
+          <a:lstStyle/>
+          <a:p>
+            <a:r>
+              <a:rPr lang="en-US" dirty="0">
+                <a:latin typeface="Cambria Math" panose="02040503050406030204" pitchFamily="18" charset="0"/>
+                <a:ea typeface="Cambria Math" panose="02040503050406030204" pitchFamily="18" charset="0"/>
+              </a:rPr>
+              <a:t>Modeled A</a:t>
+            </a:r>
+          </a:p>
+        </p:txBody>
+      </p:sp>
+      <p:sp>
+        <p:nvSpPr>
+          <p:cNvPr id="10" name="TextBox 9">
+            <a:extLst>
+              <a:ext uri="{FF2B5EF4-FFF2-40B4-BE49-F238E27FC236}">
+                <a16:creationId xmlns:a16="http://schemas.microsoft.com/office/drawing/2014/main" id="{1302E202-F7D1-1F3A-2834-2A07EF676856}"/>
+              </a:ext>
+            </a:extLst>
+          </p:cNvPr>
+          <p:cNvSpPr txBox="1"/>
+          <p:nvPr/>
+        </p:nvSpPr>
+        <p:spPr>
+          <a:xfrm rot="16200000">
+            <a:off x="787823" y="9556474"/>
+            <a:ext cx="1314305" cy="890115"/>
+          </a:xfrm>
+          <a:prstGeom prst="rect">
+            <a:avLst/>
+          </a:prstGeom>
+          <a:noFill/>
+        </p:spPr>
+        <p:txBody>
+          <a:bodyPr wrap="square" rtlCol="0">
+            <a:spAutoFit/>
+          </a:bodyPr>
+          <a:lstStyle/>
+          <a:p>
+            <a:r>
+              <a:rPr lang="en-US" dirty="0">
+                <a:latin typeface="Cambria Math" panose="02040503050406030204" pitchFamily="18" charset="0"/>
+                <a:ea typeface="Cambria Math" panose="02040503050406030204" pitchFamily="18" charset="0"/>
+              </a:rPr>
+              <a:t>Modeled A</a:t>
+            </a:r>
+          </a:p>
+        </p:txBody>
+      </p:sp>
+      <mc:AlternateContent xmlns:mc="http://schemas.openxmlformats.org/markup-compatibility/2006">
+        <mc:Choice xmlns:a14="http://schemas.microsoft.com/office/drawing/2010/main" Requires="a14">
+          <p:sp>
+            <p:nvSpPr>
+              <p:cNvPr id="11" name="TextBox 10">
+                <a:extLst>
+                  <a:ext uri="{FF2B5EF4-FFF2-40B4-BE49-F238E27FC236}">
+                    <a16:creationId xmlns:a16="http://schemas.microsoft.com/office/drawing/2014/main" id="{A1744239-7E33-5BE0-9B7D-7981F7B5B340}"/>
+                  </a:ext>
+                </a:extLst>
+              </p:cNvPr>
+              <p:cNvSpPr txBox="1"/>
+              <p:nvPr/>
+            </p:nvSpPr>
+            <p:spPr>
+              <a:xfrm>
+                <a:off x="8654943" y="13334069"/>
+                <a:ext cx="1426853" cy="491225"/>
+              </a:xfrm>
+              <a:prstGeom prst="rect">
+                <a:avLst/>
+              </a:prstGeom>
+              <a:noFill/>
+            </p:spPr>
+            <p:txBody>
+              <a:bodyPr wrap="square" rtlCol="0">
+                <a:spAutoFit/>
+              </a:bodyPr>
+              <a:lstStyle/>
+              <a:p>
+                <a:pPr/>
+                <a14:m>
+                  <m:oMathPara xmlns:m="http://schemas.openxmlformats.org/officeDocument/2006/math">
+                    <m:oMathParaPr>
+                      <m:jc m:val="centerGroup"/>
+                    </m:oMathParaPr>
+                    <m:oMath xmlns:m="http://schemas.openxmlformats.org/officeDocument/2006/math">
+                      <m:sSub>
+                        <m:sSubPr>
+                          <m:ctrlPr>
+                            <a:rPr lang="en-US" i="1">
+                              <a:latin typeface="Cambria Math" panose="02040503050406030204" pitchFamily="18" charset="0"/>
+                            </a:rPr>
+                          </m:ctrlPr>
+                        </m:sSubPr>
+                        <m:e>
+                          <m:r>
+                            <m:rPr>
+                              <m:sty m:val="p"/>
+                            </m:rPr>
+                            <a:rPr lang="en-US">
+                              <a:latin typeface="Cambria Math" panose="02040503050406030204" pitchFamily="18" charset="0"/>
+                            </a:rPr>
+                            <m:t>C</m:t>
+                          </m:r>
+                        </m:e>
+                        <m:sub>
+                          <m:r>
+                            <m:rPr>
+                              <m:sty m:val="p"/>
+                            </m:rPr>
+                            <a:rPr lang="en-US">
+                              <a:latin typeface="Cambria Math" panose="02040503050406030204" pitchFamily="18" charset="0"/>
+                            </a:rPr>
+                            <m:t>i</m:t>
+                          </m:r>
+                        </m:sub>
+                      </m:sSub>
+                    </m:oMath>
+                  </m:oMathPara>
+                </a14:m>
+                <a:endParaRPr lang="en-US" dirty="0"/>
+              </a:p>
+            </p:txBody>
+          </p:sp>
+        </mc:Choice>
+        <mc:Fallback>
+          <p:sp>
+            <p:nvSpPr>
+              <p:cNvPr id="11" name="TextBox 10">
+                <a:extLst>
+                  <a:ext uri="{FF2B5EF4-FFF2-40B4-BE49-F238E27FC236}">
+                    <a16:creationId xmlns:a16="http://schemas.microsoft.com/office/drawing/2014/main" id="{A1744239-7E33-5BE0-9B7D-7981F7B5B340}"/>
+                  </a:ext>
+                </a:extLst>
+              </p:cNvPr>
+              <p:cNvSpPr txBox="1">
+                <a:spLocks noRot="1" noChangeAspect="1" noMove="1" noResize="1" noEditPoints="1" noAdjustHandles="1" noChangeArrowheads="1" noChangeShapeType="1" noTextEdit="1"/>
+              </p:cNvSpPr>
+              <p:nvPr/>
+            </p:nvSpPr>
+            <p:spPr>
+              <a:xfrm>
+                <a:off x="8654943" y="13334069"/>
+                <a:ext cx="1426853" cy="491225"/>
+              </a:xfrm>
+              <a:prstGeom prst="rect">
+                <a:avLst/>
+              </a:prstGeom>
+              <a:blipFill>
+                <a:blip r:embed="rId10"/>
+                <a:stretch>
+                  <a:fillRect/>
+                </a:stretch>
+              </a:blipFill>
+            </p:spPr>
+            <p:txBody>
+              <a:bodyPr/>
+              <a:lstStyle/>
+              <a:p>
+                <a:r>
+                  <a:rPr lang="en-US">
+                    <a:noFill/>
+                  </a:rPr>
+                  <a:t> </a:t>
+                </a:r>
+              </a:p>
+            </p:txBody>
+          </p:sp>
+        </mc:Fallback>
+      </mc:AlternateContent>
+      <mc:AlternateContent xmlns:mc="http://schemas.openxmlformats.org/markup-compatibility/2006">
+        <mc:Choice xmlns:a14="http://schemas.microsoft.com/office/drawing/2010/main" Requires="a14">
+          <p:sp>
+            <p:nvSpPr>
+              <p:cNvPr id="12" name="TextBox 11">
+                <a:extLst>
+                  <a:ext uri="{FF2B5EF4-FFF2-40B4-BE49-F238E27FC236}">
+                    <a16:creationId xmlns:a16="http://schemas.microsoft.com/office/drawing/2014/main" id="{006469E5-D5D7-B9C8-E617-11D6239709F1}"/>
+                  </a:ext>
+                </a:extLst>
+              </p:cNvPr>
+              <p:cNvSpPr txBox="1"/>
+              <p:nvPr/>
+            </p:nvSpPr>
+            <p:spPr>
+              <a:xfrm>
+                <a:off x="3358643" y="13334068"/>
+                <a:ext cx="1426853" cy="491225"/>
+              </a:xfrm>
+              <a:prstGeom prst="rect">
+                <a:avLst/>
+              </a:prstGeom>
+              <a:noFill/>
+            </p:spPr>
+            <p:txBody>
+              <a:bodyPr wrap="square" rtlCol="0">
+                <a:spAutoFit/>
+              </a:bodyPr>
+              <a:lstStyle/>
+              <a:p>
+                <a:pPr/>
+                <a14:m>
+                  <m:oMathPara xmlns:m="http://schemas.openxmlformats.org/officeDocument/2006/math">
+                    <m:oMathParaPr>
+                      <m:jc m:val="centerGroup"/>
+                    </m:oMathParaPr>
+                    <m:oMath xmlns:m="http://schemas.openxmlformats.org/officeDocument/2006/math">
+                      <m:sSub>
+                        <m:sSubPr>
+                          <m:ctrlPr>
+                            <a:rPr lang="en-US" i="1">
+                              <a:latin typeface="Cambria Math" panose="02040503050406030204" pitchFamily="18" charset="0"/>
+                            </a:rPr>
+                          </m:ctrlPr>
+                        </m:sSubPr>
+                        <m:e>
+                          <m:r>
+                            <m:rPr>
+                              <m:sty m:val="p"/>
+                            </m:rPr>
+                            <a:rPr lang="en-US">
+                              <a:latin typeface="Cambria Math" panose="02040503050406030204" pitchFamily="18" charset="0"/>
+                            </a:rPr>
+                            <m:t>C</m:t>
+                          </m:r>
+                        </m:e>
+                        <m:sub>
+                          <m:r>
+                            <m:rPr>
+                              <m:sty m:val="p"/>
+                            </m:rPr>
+                            <a:rPr lang="en-US">
+                              <a:latin typeface="Cambria Math" panose="02040503050406030204" pitchFamily="18" charset="0"/>
+                            </a:rPr>
+                            <m:t>i</m:t>
+                          </m:r>
+                        </m:sub>
+                      </m:sSub>
+                    </m:oMath>
+                  </m:oMathPara>
+                </a14:m>
+                <a:endParaRPr lang="en-US" dirty="0"/>
+              </a:p>
+            </p:txBody>
+          </p:sp>
+        </mc:Choice>
+        <mc:Fallback>
+          <p:sp>
+            <p:nvSpPr>
+              <p:cNvPr id="12" name="TextBox 11">
+                <a:extLst>
+                  <a:ext uri="{FF2B5EF4-FFF2-40B4-BE49-F238E27FC236}">
+                    <a16:creationId xmlns:a16="http://schemas.microsoft.com/office/drawing/2014/main" id="{006469E5-D5D7-B9C8-E617-11D6239709F1}"/>
+                  </a:ext>
+                </a:extLst>
+              </p:cNvPr>
+              <p:cNvSpPr txBox="1">
+                <a:spLocks noRot="1" noChangeAspect="1" noMove="1" noResize="1" noEditPoints="1" noAdjustHandles="1" noChangeArrowheads="1" noChangeShapeType="1" noTextEdit="1"/>
+              </p:cNvSpPr>
+              <p:nvPr/>
+            </p:nvSpPr>
+            <p:spPr>
+              <a:xfrm>
+                <a:off x="3358643" y="13334068"/>
+                <a:ext cx="1426853" cy="491225"/>
+              </a:xfrm>
+              <a:prstGeom prst="rect">
+                <a:avLst/>
+              </a:prstGeom>
+              <a:blipFill>
+                <a:blip r:embed="rId11"/>
+                <a:stretch>
+                  <a:fillRect/>
+                </a:stretch>
+              </a:blipFill>
+            </p:spPr>
+            <p:txBody>
+              <a:bodyPr/>
+              <a:lstStyle/>
+              <a:p>
+                <a:r>
+                  <a:rPr lang="en-US">
+                    <a:noFill/>
+                  </a:rPr>
+                  <a:t> </a:t>
+                </a:r>
+              </a:p>
+            </p:txBody>
+          </p:sp>
+        </mc:Fallback>
+      </mc:AlternateContent>
+      <p:pic>
+        <p:nvPicPr>
+          <p:cNvPr id="13" name="Picture 12">
+            <a:extLst>
+              <a:ext uri="{FF2B5EF4-FFF2-40B4-BE49-F238E27FC236}">
+                <a16:creationId xmlns:a16="http://schemas.microsoft.com/office/drawing/2014/main" id="{25FC6324-02B2-B757-6F2A-A86EC043B4AA}"/>
+              </a:ext>
+            </a:extLst>
+          </p:cNvPr>
+          <p:cNvPicPr>
+            <a:picLocks noChangeAspect="1"/>
+          </p:cNvPicPr>
+          <p:nvPr/>
+        </p:nvPicPr>
+        <p:blipFill>
+          <a:blip r:embed="rId12"/>
+          <a:stretch>
+            <a:fillRect/>
+          </a:stretch>
+        </p:blipFill>
+        <p:spPr>
+          <a:xfrm>
+            <a:off x="12177131" y="6162052"/>
+            <a:ext cx="2068258" cy="1917657"/>
+          </a:xfrm>
+          <a:prstGeom prst="rect">
+            <a:avLst/>
+          </a:prstGeom>
+        </p:spPr>
+      </p:pic>
+      <p:sp>
+        <p:nvSpPr>
+          <p:cNvPr id="14" name="TextBox 13">
+            <a:extLst>
+              <a:ext uri="{FF2B5EF4-FFF2-40B4-BE49-F238E27FC236}">
+                <a16:creationId xmlns:a16="http://schemas.microsoft.com/office/drawing/2014/main" id="{F62E5F93-D019-C605-37C5-B3BB7AB7855B}"/>
+              </a:ext>
+            </a:extLst>
+          </p:cNvPr>
+          <p:cNvSpPr txBox="1"/>
+          <p:nvPr/>
+        </p:nvSpPr>
+        <p:spPr>
+          <a:xfrm>
+            <a:off x="2971801" y="636659"/>
+            <a:ext cx="2819184" cy="523220"/>
+          </a:xfrm>
+          <a:prstGeom prst="rect">
+            <a:avLst/>
+          </a:prstGeom>
+          <a:noFill/>
+        </p:spPr>
+        <p:txBody>
+          <a:bodyPr wrap="square" rtlCol="0">
+            <a:spAutoFit/>
+          </a:bodyPr>
+          <a:lstStyle/>
+          <a:p>
+            <a:pPr algn="ctr"/>
+            <a:r>
+              <a:rPr lang="en-US" sz="2800" b="1" dirty="0"/>
+              <a:t>Without TPU</a:t>
+            </a:r>
+          </a:p>
+        </p:txBody>
+      </p:sp>
+      <p:sp>
+        <p:nvSpPr>
+          <p:cNvPr id="15" name="TextBox 14">
+            <a:extLst>
+              <a:ext uri="{FF2B5EF4-FFF2-40B4-BE49-F238E27FC236}">
+                <a16:creationId xmlns:a16="http://schemas.microsoft.com/office/drawing/2014/main" id="{6C7248F8-B4B6-8D53-1A4D-51816119C913}"/>
+              </a:ext>
+            </a:extLst>
+          </p:cNvPr>
+          <p:cNvSpPr txBox="1"/>
+          <p:nvPr/>
+        </p:nvSpPr>
+        <p:spPr>
+          <a:xfrm>
+            <a:off x="8257235" y="636659"/>
+            <a:ext cx="2222271" cy="523220"/>
+          </a:xfrm>
+          <a:prstGeom prst="rect">
+            <a:avLst/>
+          </a:prstGeom>
+          <a:noFill/>
+        </p:spPr>
+        <p:txBody>
+          <a:bodyPr wrap="square" rtlCol="0">
+            <a:spAutoFit/>
+          </a:bodyPr>
+          <a:lstStyle/>
+          <a:p>
+            <a:pPr algn="ctr"/>
+            <a:r>
+              <a:rPr lang="en-US" sz="2800" b="1" dirty="0"/>
+              <a:t>With TPU</a:t>
+            </a:r>
+          </a:p>
+        </p:txBody>
+      </p:sp>
+      <p:sp>
+        <p:nvSpPr>
+          <p:cNvPr id="16" name="TextBox 15">
+            <a:extLst>
+              <a:ext uri="{FF2B5EF4-FFF2-40B4-BE49-F238E27FC236}">
+                <a16:creationId xmlns:a16="http://schemas.microsoft.com/office/drawing/2014/main" id="{D4154D15-332F-AF10-D4D8-059FF3D35D7F}"/>
+              </a:ext>
+            </a:extLst>
+          </p:cNvPr>
+          <p:cNvSpPr txBox="1"/>
+          <p:nvPr/>
+        </p:nvSpPr>
+        <p:spPr>
+          <a:xfrm>
+            <a:off x="5494415" y="67210"/>
+            <a:ext cx="2819184" cy="646331"/>
+          </a:xfrm>
+          <a:prstGeom prst="rect">
+            <a:avLst/>
+          </a:prstGeom>
+          <a:noFill/>
+        </p:spPr>
+        <p:txBody>
+          <a:bodyPr wrap="square" rtlCol="0">
+            <a:spAutoFit/>
+          </a:bodyPr>
+          <a:lstStyle/>
+          <a:p>
+            <a:pPr algn="ctr"/>
+            <a:r>
+              <a:rPr lang="en-US" sz="3600" b="1" dirty="0"/>
+              <a:t>K6706L1</a:t>
+            </a:r>
+          </a:p>
+        </p:txBody>
+      </p:sp>
     </p:spTree>
     <p:extLst>
       <p:ext uri="{BB962C8B-B14F-4D97-AF65-F5344CB8AC3E}">
@@ -7269,7 +7606,7 @@
 <file path=ppt/theme/theme1.xml><?xml version="1.0" encoding="utf-8"?>
 <a:theme xmlns:a="http://schemas.openxmlformats.org/drawingml/2006/main" name="Office Theme">
   <a:themeElements>
-    <a:clrScheme name="Office">
+    <a:clrScheme name="Office Theme">
       <a:dk1>
         <a:sysClr val="windowText" lastClr="000000"/>
       </a:dk1>
@@ -7307,7 +7644,7 @@
         <a:srgbClr val="954F72"/>
       </a:folHlink>
     </a:clrScheme>
-    <a:fontScheme name="Office">
+    <a:fontScheme name="Office Theme">
       <a:majorFont>
         <a:latin typeface="Calibri Light" panose="020F0302020204030204"/>
         <a:ea typeface=""/>
@@ -7342,23 +7679,6 @@
         <a:font script="Viet" typeface="Times New Roman"/>
         <a:font script="Uigh" typeface="Microsoft Uighur"/>
         <a:font script="Geor" typeface="Sylfaen"/>
-        <a:font script="Armn" typeface="Arial"/>
-        <a:font script="Bugi" typeface="Leelawadee UI"/>
-        <a:font script="Bopo" typeface="Microsoft JhengHei"/>
-        <a:font script="Java" typeface="Javanese Text"/>
-        <a:font script="Lisu" typeface="Segoe UI"/>
-        <a:font script="Mymr" typeface="Myanmar Text"/>
-        <a:font script="Nkoo" typeface="Ebrima"/>
-        <a:font script="Olck" typeface="Nirmala UI"/>
-        <a:font script="Osma" typeface="Ebrima"/>
-        <a:font script="Phag" typeface="Phagspa"/>
-        <a:font script="Syrn" typeface="Estrangelo Edessa"/>
-        <a:font script="Syrj" typeface="Estrangelo Edessa"/>
-        <a:font script="Syre" typeface="Estrangelo Edessa"/>
-        <a:font script="Sora" typeface="Nirmala UI"/>
-        <a:font script="Tale" typeface="Microsoft Tai Le"/>
-        <a:font script="Talu" typeface="Microsoft New Tai Lue"/>
-        <a:font script="Tfng" typeface="Ebrima"/>
       </a:majorFont>
       <a:minorFont>
         <a:latin typeface="Calibri" panose="020F0502020204030204"/>
@@ -7394,26 +7714,9 @@
         <a:font script="Viet" typeface="Arial"/>
         <a:font script="Uigh" typeface="Microsoft Uighur"/>
         <a:font script="Geor" typeface="Sylfaen"/>
-        <a:font script="Armn" typeface="Arial"/>
-        <a:font script="Bugi" typeface="Leelawadee UI"/>
-        <a:font script="Bopo" typeface="Microsoft JhengHei"/>
-        <a:font script="Java" typeface="Javanese Text"/>
-        <a:font script="Lisu" typeface="Segoe UI"/>
-        <a:font script="Mymr" typeface="Myanmar Text"/>
-        <a:font script="Nkoo" typeface="Ebrima"/>
-        <a:font script="Olck" typeface="Nirmala UI"/>
-        <a:font script="Osma" typeface="Ebrima"/>
-        <a:font script="Phag" typeface="Phagspa"/>
-        <a:font script="Syrn" typeface="Estrangelo Edessa"/>
-        <a:font script="Syrj" typeface="Estrangelo Edessa"/>
-        <a:font script="Syre" typeface="Estrangelo Edessa"/>
-        <a:font script="Sora" typeface="Nirmala UI"/>
-        <a:font script="Tale" typeface="Microsoft Tai Le"/>
-        <a:font script="Talu" typeface="Microsoft New Tai Lue"/>
-        <a:font script="Tfng" typeface="Ebrima"/>
       </a:minorFont>
     </a:fontScheme>
-    <a:fmtScheme name="Office">
+    <a:fmtScheme name="Office Theme">
       <a:fillStyleLst>
         <a:solidFill>
           <a:schemeClr val="phClr"/>
@@ -7555,7 +7858,7 @@
   <a:extraClrSchemeLst/>
   <a:extLst>
     <a:ext uri="{05A4C25C-085E-4340-85A3-A5531E510DB2}">
-      <thm15:themeFamily xmlns:thm15="http://schemas.microsoft.com/office/thememl/2012/main" name="Office Theme" id="{62F939B6-93AF-4DB8-9C6B-D6C7DFDC589F}" vid="{4A3C46E8-61CC-4603-A589-7422A47A8E4A}"/>
+      <thm15:themeFamily xmlns:thm15="http://schemas.microsoft.com/office/thememl/2012/main" name="Office Theme 2013 - 2022" id="{62F939B6-93AF-4DB8-9C6B-D6C7DFDC589F}" vid="{4A3C46E8-61CC-4603-A589-7422A47A8E4A}"/>
     </a:ext>
   </a:extLst>
 </a:theme>

</xml_diff>